<commit_message>
update w/work over break
</commit_message>
<xml_diff>
--- a/presentation draft.pptx
+++ b/presentation draft.pptx
@@ -4,13 +4,16 @@
   <p:sldMasterIdLst>
     <p:sldMasterId id="2147483753" r:id="rId1"/>
   </p:sldMasterIdLst>
+  <p:notesMasterIdLst>
+    <p:notesMasterId r:id="rId10"/>
+  </p:notesMasterIdLst>
   <p:sldIdLst>
     <p:sldId id="256" r:id="rId2"/>
     <p:sldId id="257" r:id="rId3"/>
     <p:sldId id="259" r:id="rId4"/>
     <p:sldId id="261" r:id="rId5"/>
-    <p:sldId id="262" r:id="rId6"/>
-    <p:sldId id="265" r:id="rId7"/>
+    <p:sldId id="266" r:id="rId6"/>
+    <p:sldId id="267" r:id="rId7"/>
     <p:sldId id="263" r:id="rId8"/>
     <p:sldId id="260" r:id="rId9"/>
   </p:sldIdLst>
@@ -119,6 +122,515 @@
 </p:presentation>
 </file>
 
+<file path=ppt/notesMasters/notesMaster1.xml><?xml version="1.0" encoding="utf-8"?>
+<p:notesMaster xmlns:a="http://schemas.openxmlformats.org/drawingml/2006/main" xmlns:r="http://schemas.openxmlformats.org/officeDocument/2006/relationships" xmlns:p="http://schemas.openxmlformats.org/presentationml/2006/main">
+  <p:cSld>
+    <p:bg>
+      <p:bgRef idx="1001">
+        <a:schemeClr val="bg1"/>
+      </p:bgRef>
+    </p:bg>
+    <p:spTree>
+      <p:nvGrpSpPr>
+        <p:cNvPr id="1" name=""/>
+        <p:cNvGrpSpPr/>
+        <p:nvPr/>
+      </p:nvGrpSpPr>
+      <p:grpSpPr>
+        <a:xfrm>
+          <a:off x="0" y="0"/>
+          <a:ext cx="0" cy="0"/>
+          <a:chOff x="0" y="0"/>
+          <a:chExt cx="0" cy="0"/>
+        </a:xfrm>
+      </p:grpSpPr>
+      <p:sp>
+        <p:nvSpPr>
+          <p:cNvPr id="2" name="Header Placeholder 1"/>
+          <p:cNvSpPr>
+            <a:spLocks noGrp="1"/>
+          </p:cNvSpPr>
+          <p:nvPr>
+            <p:ph type="hdr" sz="quarter"/>
+          </p:nvPr>
+        </p:nvSpPr>
+        <p:spPr>
+          <a:xfrm>
+            <a:off x="0" y="0"/>
+            <a:ext cx="2971800" cy="458788"/>
+          </a:xfrm>
+          <a:prstGeom prst="rect">
+            <a:avLst/>
+          </a:prstGeom>
+        </p:spPr>
+        <p:txBody>
+          <a:bodyPr vert="horz" lIns="91440" tIns="45720" rIns="91440" bIns="45720" rtlCol="0"/>
+          <a:lstStyle>
+            <a:lvl1pPr algn="l">
+              <a:defRPr sz="1200"/>
+            </a:lvl1pPr>
+          </a:lstStyle>
+          <a:p>
+            <a:endParaRPr lang="en-US"/>
+          </a:p>
+        </p:txBody>
+      </p:sp>
+      <p:sp>
+        <p:nvSpPr>
+          <p:cNvPr id="3" name="Date Placeholder 2"/>
+          <p:cNvSpPr>
+            <a:spLocks noGrp="1"/>
+          </p:cNvSpPr>
+          <p:nvPr>
+            <p:ph type="dt" idx="1"/>
+          </p:nvPr>
+        </p:nvSpPr>
+        <p:spPr>
+          <a:xfrm>
+            <a:off x="3884613" y="0"/>
+            <a:ext cx="2971800" cy="458788"/>
+          </a:xfrm>
+          <a:prstGeom prst="rect">
+            <a:avLst/>
+          </a:prstGeom>
+        </p:spPr>
+        <p:txBody>
+          <a:bodyPr vert="horz" lIns="91440" tIns="45720" rIns="91440" bIns="45720" rtlCol="0"/>
+          <a:lstStyle>
+            <a:lvl1pPr algn="r">
+              <a:defRPr sz="1200"/>
+            </a:lvl1pPr>
+          </a:lstStyle>
+          <a:p>
+            <a:fld id="{7734F6C5-14D3-4C8A-B4DA-80FCB6E09599}" type="datetimeFigureOut">
+              <a:rPr lang="en-US" smtClean="0"/>
+              <a:t>12/29/2025</a:t>
+            </a:fld>
+            <a:endParaRPr lang="en-US"/>
+          </a:p>
+        </p:txBody>
+      </p:sp>
+      <p:sp>
+        <p:nvSpPr>
+          <p:cNvPr id="4" name="Slide Image Placeholder 3"/>
+          <p:cNvSpPr>
+            <a:spLocks noGrp="1" noRot="1" noChangeAspect="1"/>
+          </p:cNvSpPr>
+          <p:nvPr>
+            <p:ph type="sldImg" idx="2"/>
+          </p:nvPr>
+        </p:nvSpPr>
+        <p:spPr>
+          <a:xfrm>
+            <a:off x="685800" y="1143000"/>
+            <a:ext cx="5486400" cy="3086100"/>
+          </a:xfrm>
+          <a:prstGeom prst="rect">
+            <a:avLst/>
+          </a:prstGeom>
+          <a:noFill/>
+          <a:ln w="12700">
+            <a:solidFill>
+              <a:prstClr val="black"/>
+            </a:solidFill>
+          </a:ln>
+        </p:spPr>
+        <p:txBody>
+          <a:bodyPr vert="horz" lIns="91440" tIns="45720" rIns="91440" bIns="45720" rtlCol="0" anchor="ctr"/>
+          <a:lstStyle/>
+          <a:p>
+            <a:endParaRPr lang="en-US"/>
+          </a:p>
+        </p:txBody>
+      </p:sp>
+      <p:sp>
+        <p:nvSpPr>
+          <p:cNvPr id="5" name="Notes Placeholder 4"/>
+          <p:cNvSpPr>
+            <a:spLocks noGrp="1"/>
+          </p:cNvSpPr>
+          <p:nvPr>
+            <p:ph type="body" sz="quarter" idx="3"/>
+          </p:nvPr>
+        </p:nvSpPr>
+        <p:spPr>
+          <a:xfrm>
+            <a:off x="685800" y="4400550"/>
+            <a:ext cx="5486400" cy="3600450"/>
+          </a:xfrm>
+          <a:prstGeom prst="rect">
+            <a:avLst/>
+          </a:prstGeom>
+        </p:spPr>
+        <p:txBody>
+          <a:bodyPr vert="horz" lIns="91440" tIns="45720" rIns="91440" bIns="45720" rtlCol="0"/>
+          <a:lstStyle/>
+          <a:p>
+            <a:pPr lvl="0"/>
+            <a:r>
+              <a:rPr lang="en-US"/>
+              <a:t>Click to edit Master text styles</a:t>
+            </a:r>
+          </a:p>
+          <a:p>
+            <a:pPr lvl="1"/>
+            <a:r>
+              <a:rPr lang="en-US"/>
+              <a:t>Second level</a:t>
+            </a:r>
+          </a:p>
+          <a:p>
+            <a:pPr lvl="2"/>
+            <a:r>
+              <a:rPr lang="en-US"/>
+              <a:t>Third level</a:t>
+            </a:r>
+          </a:p>
+          <a:p>
+            <a:pPr lvl="3"/>
+            <a:r>
+              <a:rPr lang="en-US"/>
+              <a:t>Fourth level</a:t>
+            </a:r>
+          </a:p>
+          <a:p>
+            <a:pPr lvl="4"/>
+            <a:r>
+              <a:rPr lang="en-US"/>
+              <a:t>Fifth level</a:t>
+            </a:r>
+          </a:p>
+        </p:txBody>
+      </p:sp>
+      <p:sp>
+        <p:nvSpPr>
+          <p:cNvPr id="6" name="Footer Placeholder 5"/>
+          <p:cNvSpPr>
+            <a:spLocks noGrp="1"/>
+          </p:cNvSpPr>
+          <p:nvPr>
+            <p:ph type="ftr" sz="quarter" idx="4"/>
+          </p:nvPr>
+        </p:nvSpPr>
+        <p:spPr>
+          <a:xfrm>
+            <a:off x="0" y="8685213"/>
+            <a:ext cx="2971800" cy="458787"/>
+          </a:xfrm>
+          <a:prstGeom prst="rect">
+            <a:avLst/>
+          </a:prstGeom>
+        </p:spPr>
+        <p:txBody>
+          <a:bodyPr vert="horz" lIns="91440" tIns="45720" rIns="91440" bIns="45720" rtlCol="0" anchor="b"/>
+          <a:lstStyle>
+            <a:lvl1pPr algn="l">
+              <a:defRPr sz="1200"/>
+            </a:lvl1pPr>
+          </a:lstStyle>
+          <a:p>
+            <a:endParaRPr lang="en-US"/>
+          </a:p>
+        </p:txBody>
+      </p:sp>
+      <p:sp>
+        <p:nvSpPr>
+          <p:cNvPr id="7" name="Slide Number Placeholder 6"/>
+          <p:cNvSpPr>
+            <a:spLocks noGrp="1"/>
+          </p:cNvSpPr>
+          <p:nvPr>
+            <p:ph type="sldNum" sz="quarter" idx="5"/>
+          </p:nvPr>
+        </p:nvSpPr>
+        <p:spPr>
+          <a:xfrm>
+            <a:off x="3884613" y="8685213"/>
+            <a:ext cx="2971800" cy="458787"/>
+          </a:xfrm>
+          <a:prstGeom prst="rect">
+            <a:avLst/>
+          </a:prstGeom>
+        </p:spPr>
+        <p:txBody>
+          <a:bodyPr vert="horz" lIns="91440" tIns="45720" rIns="91440" bIns="45720" rtlCol="0" anchor="b"/>
+          <a:lstStyle>
+            <a:lvl1pPr algn="r">
+              <a:defRPr sz="1200"/>
+            </a:lvl1pPr>
+          </a:lstStyle>
+          <a:p>
+            <a:fld id="{602EF81E-7198-4166-9295-810162322651}" type="slidenum">
+              <a:rPr lang="en-US" smtClean="0"/>
+              <a:t>‹#›</a:t>
+            </a:fld>
+            <a:endParaRPr lang="en-US"/>
+          </a:p>
+        </p:txBody>
+      </p:sp>
+    </p:spTree>
+    <p:extLst>
+      <p:ext uri="{BB962C8B-B14F-4D97-AF65-F5344CB8AC3E}">
+        <p14:creationId xmlns:p14="http://schemas.microsoft.com/office/powerpoint/2010/main" val="1704225175"/>
+      </p:ext>
+    </p:extLst>
+  </p:cSld>
+  <p:clrMap bg1="lt1" tx1="dk1" bg2="lt2" tx2="dk2" accent1="accent1" accent2="accent2" accent3="accent3" accent4="accent4" accent5="accent5" accent6="accent6" hlink="hlink" folHlink="folHlink"/>
+  <p:notesStyle>
+    <a:lvl1pPr marL="0" algn="l" defTabSz="914400" rtl="0" eaLnBrk="1" latinLnBrk="0" hangingPunct="1">
+      <a:defRPr sz="1200" kern="1200">
+        <a:solidFill>
+          <a:schemeClr val="tx1"/>
+        </a:solidFill>
+        <a:latin typeface="+mn-lt"/>
+        <a:ea typeface="+mn-ea"/>
+        <a:cs typeface="+mn-cs"/>
+      </a:defRPr>
+    </a:lvl1pPr>
+    <a:lvl2pPr marL="457200" algn="l" defTabSz="914400" rtl="0" eaLnBrk="1" latinLnBrk="0" hangingPunct="1">
+      <a:defRPr sz="1200" kern="1200">
+        <a:solidFill>
+          <a:schemeClr val="tx1"/>
+        </a:solidFill>
+        <a:latin typeface="+mn-lt"/>
+        <a:ea typeface="+mn-ea"/>
+        <a:cs typeface="+mn-cs"/>
+      </a:defRPr>
+    </a:lvl2pPr>
+    <a:lvl3pPr marL="914400" algn="l" defTabSz="914400" rtl="0" eaLnBrk="1" latinLnBrk="0" hangingPunct="1">
+      <a:defRPr sz="1200" kern="1200">
+        <a:solidFill>
+          <a:schemeClr val="tx1"/>
+        </a:solidFill>
+        <a:latin typeface="+mn-lt"/>
+        <a:ea typeface="+mn-ea"/>
+        <a:cs typeface="+mn-cs"/>
+      </a:defRPr>
+    </a:lvl3pPr>
+    <a:lvl4pPr marL="1371600" algn="l" defTabSz="914400" rtl="0" eaLnBrk="1" latinLnBrk="0" hangingPunct="1">
+      <a:defRPr sz="1200" kern="1200">
+        <a:solidFill>
+          <a:schemeClr val="tx1"/>
+        </a:solidFill>
+        <a:latin typeface="+mn-lt"/>
+        <a:ea typeface="+mn-ea"/>
+        <a:cs typeface="+mn-cs"/>
+      </a:defRPr>
+    </a:lvl4pPr>
+    <a:lvl5pPr marL="1828800" algn="l" defTabSz="914400" rtl="0" eaLnBrk="1" latinLnBrk="0" hangingPunct="1">
+      <a:defRPr sz="1200" kern="1200">
+        <a:solidFill>
+          <a:schemeClr val="tx1"/>
+        </a:solidFill>
+        <a:latin typeface="+mn-lt"/>
+        <a:ea typeface="+mn-ea"/>
+        <a:cs typeface="+mn-cs"/>
+      </a:defRPr>
+    </a:lvl5pPr>
+    <a:lvl6pPr marL="2286000" algn="l" defTabSz="914400" rtl="0" eaLnBrk="1" latinLnBrk="0" hangingPunct="1">
+      <a:defRPr sz="1200" kern="1200">
+        <a:solidFill>
+          <a:schemeClr val="tx1"/>
+        </a:solidFill>
+        <a:latin typeface="+mn-lt"/>
+        <a:ea typeface="+mn-ea"/>
+        <a:cs typeface="+mn-cs"/>
+      </a:defRPr>
+    </a:lvl6pPr>
+    <a:lvl7pPr marL="2743200" algn="l" defTabSz="914400" rtl="0" eaLnBrk="1" latinLnBrk="0" hangingPunct="1">
+      <a:defRPr sz="1200" kern="1200">
+        <a:solidFill>
+          <a:schemeClr val="tx1"/>
+        </a:solidFill>
+        <a:latin typeface="+mn-lt"/>
+        <a:ea typeface="+mn-ea"/>
+        <a:cs typeface="+mn-cs"/>
+      </a:defRPr>
+    </a:lvl7pPr>
+    <a:lvl8pPr marL="3200400" algn="l" defTabSz="914400" rtl="0" eaLnBrk="1" latinLnBrk="0" hangingPunct="1">
+      <a:defRPr sz="1200" kern="1200">
+        <a:solidFill>
+          <a:schemeClr val="tx1"/>
+        </a:solidFill>
+        <a:latin typeface="+mn-lt"/>
+        <a:ea typeface="+mn-ea"/>
+        <a:cs typeface="+mn-cs"/>
+      </a:defRPr>
+    </a:lvl8pPr>
+    <a:lvl9pPr marL="3657600" algn="l" defTabSz="914400" rtl="0" eaLnBrk="1" latinLnBrk="0" hangingPunct="1">
+      <a:defRPr sz="1200" kern="1200">
+        <a:solidFill>
+          <a:schemeClr val="tx1"/>
+        </a:solidFill>
+        <a:latin typeface="+mn-lt"/>
+        <a:ea typeface="+mn-ea"/>
+        <a:cs typeface="+mn-cs"/>
+      </a:defRPr>
+    </a:lvl9pPr>
+  </p:notesStyle>
+</p:notesMaster>
+</file>
+
+<file path=ppt/notesSlides/notesSlide1.xml><?xml version="1.0" encoding="utf-8"?>
+<p:notes xmlns:a="http://schemas.openxmlformats.org/drawingml/2006/main" xmlns:r="http://schemas.openxmlformats.org/officeDocument/2006/relationships" xmlns:p="http://schemas.openxmlformats.org/presentationml/2006/main">
+  <p:cSld>
+    <p:spTree>
+      <p:nvGrpSpPr>
+        <p:cNvPr id="1" name=""/>
+        <p:cNvGrpSpPr/>
+        <p:nvPr/>
+      </p:nvGrpSpPr>
+      <p:grpSpPr>
+        <a:xfrm>
+          <a:off x="0" y="0"/>
+          <a:ext cx="0" cy="0"/>
+          <a:chOff x="0" y="0"/>
+          <a:chExt cx="0" cy="0"/>
+        </a:xfrm>
+      </p:grpSpPr>
+      <p:sp>
+        <p:nvSpPr>
+          <p:cNvPr id="2" name="Slide Image Placeholder 1"/>
+          <p:cNvSpPr>
+            <a:spLocks noGrp="1" noRot="1" noChangeAspect="1"/>
+          </p:cNvSpPr>
+          <p:nvPr>
+            <p:ph type="sldImg"/>
+          </p:nvPr>
+        </p:nvSpPr>
+        <p:spPr/>
+      </p:sp>
+      <p:sp>
+        <p:nvSpPr>
+          <p:cNvPr id="3" name="Notes Placeholder 2"/>
+          <p:cNvSpPr>
+            <a:spLocks noGrp="1"/>
+          </p:cNvSpPr>
+          <p:nvPr>
+            <p:ph type="body" idx="1"/>
+          </p:nvPr>
+        </p:nvSpPr>
+        <p:spPr/>
+        <p:txBody>
+          <a:bodyPr/>
+          <a:lstStyle/>
+          <a:p>
+            <a:r>
+              <a:rPr lang="en-US" dirty="0"/>
+              <a:t>Spike correlations:</a:t>
+            </a:r>
+          </a:p>
+          <a:p>
+            <a:r>
+              <a:rPr lang="en-US" dirty="0"/>
+              <a:t>Harry Potter – SPL re-acquires digital versions of the HP books; digital borrowing rises during COVID-19 lockdowns</a:t>
+            </a:r>
+          </a:p>
+          <a:p>
+            <a:r>
+              <a:rPr lang="en-US" dirty="0"/>
+              <a:t>Invisible – Unsure</a:t>
+            </a:r>
+          </a:p>
+          <a:p>
+            <a:r>
+              <a:rPr lang="en-US" dirty="0"/>
+              <a:t>Turtles All The Way Down – initial book release</a:t>
+            </a:r>
+          </a:p>
+          <a:p>
+            <a:r>
+              <a:rPr lang="en-US" dirty="0"/>
+              <a:t>The Red Pencil – unsure</a:t>
+            </a:r>
+          </a:p>
+          <a:p>
+            <a:r>
+              <a:rPr lang="en-US" dirty="0"/>
+              <a:t>Wonder – film release in 2017</a:t>
+            </a:r>
+          </a:p>
+          <a:p>
+            <a:r>
+              <a:rPr lang="en-US" dirty="0"/>
+              <a:t>The Hate U Give – unsure (spike is pre-movie release but well after book release, maybe correlates with awards?)</a:t>
+            </a:r>
+          </a:p>
+          <a:p>
+            <a:r>
+              <a:rPr lang="en-US" dirty="0"/>
+              <a:t>A Wrinkle in Time – 2018 film adaptation</a:t>
+            </a:r>
+          </a:p>
+          <a:p>
+            <a:r>
+              <a:rPr lang="en-US" dirty="0" err="1"/>
+              <a:t>Mexikid</a:t>
+            </a:r>
+            <a:r>
+              <a:rPr lang="en-US" dirty="0"/>
+              <a:t> – Newberry Honor winner</a:t>
+            </a:r>
+          </a:p>
+          <a:p>
+            <a:r>
+              <a:rPr lang="en-US" dirty="0"/>
+              <a:t>I Can Make This Promise – unsure</a:t>
+            </a:r>
+          </a:p>
+          <a:p>
+            <a:r>
+              <a:rPr lang="en-US" dirty="0"/>
+              <a:t>Hot Mess – initial release</a:t>
+            </a:r>
+          </a:p>
+          <a:p>
+            <a:endParaRPr lang="en-US" dirty="0"/>
+          </a:p>
+          <a:p>
+            <a:endParaRPr lang="en-US" dirty="0"/>
+          </a:p>
+          <a:p>
+            <a:endParaRPr lang="en-US" dirty="0"/>
+          </a:p>
+        </p:txBody>
+      </p:sp>
+      <p:sp>
+        <p:nvSpPr>
+          <p:cNvPr id="4" name="Slide Number Placeholder 3"/>
+          <p:cNvSpPr>
+            <a:spLocks noGrp="1"/>
+          </p:cNvSpPr>
+          <p:nvPr>
+            <p:ph type="sldNum" sz="quarter" idx="5"/>
+          </p:nvPr>
+        </p:nvSpPr>
+        <p:spPr/>
+        <p:txBody>
+          <a:bodyPr/>
+          <a:lstStyle/>
+          <a:p>
+            <a:fld id="{602EF81E-7198-4166-9295-810162322651}" type="slidenum">
+              <a:rPr lang="en-US" smtClean="0"/>
+              <a:t>6</a:t>
+            </a:fld>
+            <a:endParaRPr lang="en-US"/>
+          </a:p>
+        </p:txBody>
+      </p:sp>
+    </p:spTree>
+    <p:extLst>
+      <p:ext uri="{BB962C8B-B14F-4D97-AF65-F5344CB8AC3E}">
+        <p14:creationId xmlns:p14="http://schemas.microsoft.com/office/powerpoint/2010/main" val="3029346442"/>
+      </p:ext>
+    </p:extLst>
+  </p:cSld>
+  <p:clrMapOvr>
+    <a:masterClrMapping/>
+  </p:clrMapOvr>
+</p:notes>
+</file>
+
 <file path=ppt/slideLayouts/slideLayout1.xml><?xml version="1.0" encoding="utf-8"?>
 <p:sldLayout xmlns:a="http://schemas.openxmlformats.org/drawingml/2006/main" xmlns:r="http://schemas.openxmlformats.org/officeDocument/2006/relationships" xmlns:p="http://schemas.openxmlformats.org/presentationml/2006/main" showMasterSp="0" type="title" preserve="1">
   <p:cSld name="Title Slide">
@@ -177,7 +689,7 @@
           <a:bodyPr/>
           <a:lstStyle/>
           <a:p>
-            <a:endParaRPr lang="en-US"/>
+            <a:endParaRPr lang="en-US" dirty="0"/>
           </a:p>
         </p:txBody>
       </p:sp>
@@ -222,7 +734,7 @@
           <a:bodyPr/>
           <a:lstStyle/>
           <a:p>
-            <a:endParaRPr lang="en-US"/>
+            <a:endParaRPr lang="en-US" dirty="0"/>
           </a:p>
         </p:txBody>
       </p:sp>
@@ -359,9 +871,9 @@
           <a:p>
             <a:fld id="{D341B595-366B-43E2-A22E-EA6A78C03F06}" type="datetimeFigureOut">
               <a:rPr lang="en-US" smtClean="0"/>
-              <a:t>12/22/2025</a:t>
+              <a:t>12/29/2025</a:t>
             </a:fld>
-            <a:endParaRPr lang="en-US"/>
+            <a:endParaRPr lang="en-US" dirty="0"/>
           </a:p>
         </p:txBody>
       </p:sp>
@@ -380,7 +892,7 @@
           <a:bodyPr/>
           <a:lstStyle/>
           <a:p>
-            <a:endParaRPr lang="en-US"/>
+            <a:endParaRPr lang="en-US" dirty="0"/>
           </a:p>
         </p:txBody>
       </p:sp>
@@ -403,7 +915,7 @@
               <a:rPr lang="en-US" smtClean="0"/>
               <a:t>‹#›</a:t>
             </a:fld>
-            <a:endParaRPr lang="en-US"/>
+            <a:endParaRPr lang="en-US" dirty="0"/>
           </a:p>
         </p:txBody>
       </p:sp>
@@ -567,9 +1079,9 @@
           <a:p>
             <a:fld id="{D341B595-366B-43E2-A22E-EA6A78C03F06}" type="datetimeFigureOut">
               <a:rPr lang="en-US" smtClean="0"/>
-              <a:t>12/22/2025</a:t>
+              <a:t>12/29/2025</a:t>
             </a:fld>
-            <a:endParaRPr lang="en-US"/>
+            <a:endParaRPr lang="en-US" dirty="0"/>
           </a:p>
         </p:txBody>
       </p:sp>
@@ -588,7 +1100,7 @@
           <a:bodyPr/>
           <a:lstStyle/>
           <a:p>
-            <a:endParaRPr lang="en-US"/>
+            <a:endParaRPr lang="en-US" dirty="0"/>
           </a:p>
         </p:txBody>
       </p:sp>
@@ -611,7 +1123,7 @@
               <a:rPr lang="en-US" smtClean="0"/>
               <a:t>‹#›</a:t>
             </a:fld>
-            <a:endParaRPr lang="en-US"/>
+            <a:endParaRPr lang="en-US" dirty="0"/>
           </a:p>
         </p:txBody>
       </p:sp>
@@ -823,9 +1335,9 @@
           <a:p>
             <a:fld id="{D341B595-366B-43E2-A22E-EA6A78C03F06}" type="datetimeFigureOut">
               <a:rPr lang="en-US" smtClean="0"/>
-              <a:t>12/22/2025</a:t>
+              <a:t>12/29/2025</a:t>
             </a:fld>
-            <a:endParaRPr lang="en-US"/>
+            <a:endParaRPr lang="en-US" dirty="0"/>
           </a:p>
         </p:txBody>
       </p:sp>
@@ -844,7 +1356,7 @@
           <a:bodyPr/>
           <a:lstStyle/>
           <a:p>
-            <a:endParaRPr lang="en-US"/>
+            <a:endParaRPr lang="en-US" dirty="0"/>
           </a:p>
         </p:txBody>
       </p:sp>
@@ -867,7 +1379,7 @@
               <a:rPr lang="en-US" smtClean="0"/>
               <a:t>‹#›</a:t>
             </a:fld>
-            <a:endParaRPr lang="en-US"/>
+            <a:endParaRPr lang="en-US" dirty="0"/>
           </a:p>
         </p:txBody>
       </p:sp>
@@ -997,9 +1509,9 @@
           <a:p>
             <a:fld id="{D341B595-366B-43E2-A22E-EA6A78C03F06}" type="datetimeFigureOut">
               <a:rPr lang="en-US" smtClean="0"/>
-              <a:t>12/22/2025</a:t>
+              <a:t>12/29/2025</a:t>
             </a:fld>
-            <a:endParaRPr lang="en-US"/>
+            <a:endParaRPr lang="en-US" dirty="0"/>
           </a:p>
         </p:txBody>
       </p:sp>
@@ -1018,7 +1530,7 @@
           <a:bodyPr/>
           <a:lstStyle/>
           <a:p>
-            <a:endParaRPr lang="en-US"/>
+            <a:endParaRPr lang="en-US" dirty="0"/>
           </a:p>
         </p:txBody>
       </p:sp>
@@ -1041,7 +1553,7 @@
               <a:rPr lang="en-US" smtClean="0"/>
               <a:t>‹#›</a:t>
             </a:fld>
-            <a:endParaRPr lang="en-US"/>
+            <a:endParaRPr lang="en-US" dirty="0"/>
           </a:p>
         </p:txBody>
       </p:sp>
@@ -1340,9 +1852,9 @@
           <a:p>
             <a:fld id="{D341B595-366B-43E2-A22E-EA6A78C03F06}" type="datetimeFigureOut">
               <a:rPr lang="en-US" smtClean="0"/>
-              <a:t>12/22/2025</a:t>
+              <a:t>12/29/2025</a:t>
             </a:fld>
-            <a:endParaRPr lang="en-US"/>
+            <a:endParaRPr lang="en-US" dirty="0"/>
           </a:p>
         </p:txBody>
       </p:sp>
@@ -1361,7 +1873,7 @@
           <a:bodyPr/>
           <a:lstStyle/>
           <a:p>
-            <a:endParaRPr lang="en-US"/>
+            <a:endParaRPr lang="en-US" dirty="0"/>
           </a:p>
         </p:txBody>
       </p:sp>
@@ -1384,7 +1896,7 @@
               <a:rPr lang="en-US" smtClean="0"/>
               <a:t>‹#›</a:t>
             </a:fld>
-            <a:endParaRPr lang="en-US"/>
+            <a:endParaRPr lang="en-US" dirty="0"/>
           </a:p>
         </p:txBody>
       </p:sp>
@@ -1615,9 +2127,9 @@
           <a:p>
             <a:fld id="{D341B595-366B-43E2-A22E-EA6A78C03F06}" type="datetimeFigureOut">
               <a:rPr lang="en-US" smtClean="0"/>
-              <a:t>12/22/2025</a:t>
+              <a:t>12/29/2025</a:t>
             </a:fld>
-            <a:endParaRPr lang="en-US"/>
+            <a:endParaRPr lang="en-US" dirty="0"/>
           </a:p>
         </p:txBody>
       </p:sp>
@@ -1636,7 +2148,7 @@
           <a:bodyPr/>
           <a:lstStyle/>
           <a:p>
-            <a:endParaRPr lang="en-US"/>
+            <a:endParaRPr lang="en-US" dirty="0"/>
           </a:p>
         </p:txBody>
       </p:sp>
@@ -1659,7 +2171,7 @@
               <a:rPr lang="en-US" smtClean="0"/>
               <a:t>‹#›</a:t>
             </a:fld>
-            <a:endParaRPr lang="en-US"/>
+            <a:endParaRPr lang="en-US" dirty="0"/>
           </a:p>
         </p:txBody>
       </p:sp>
@@ -1994,9 +2506,9 @@
           <a:p>
             <a:fld id="{D341B595-366B-43E2-A22E-EA6A78C03F06}" type="datetimeFigureOut">
               <a:rPr lang="en-US" smtClean="0"/>
-              <a:t>12/22/2025</a:t>
+              <a:t>12/29/2025</a:t>
             </a:fld>
-            <a:endParaRPr lang="en-US"/>
+            <a:endParaRPr lang="en-US" dirty="0"/>
           </a:p>
         </p:txBody>
       </p:sp>
@@ -2015,7 +2527,7 @@
           <a:bodyPr/>
           <a:lstStyle/>
           <a:p>
-            <a:endParaRPr lang="en-US"/>
+            <a:endParaRPr lang="en-US" dirty="0"/>
           </a:p>
         </p:txBody>
       </p:sp>
@@ -2038,7 +2550,7 @@
               <a:rPr lang="en-US" smtClean="0"/>
               <a:t>‹#›</a:t>
             </a:fld>
-            <a:endParaRPr lang="en-US"/>
+            <a:endParaRPr lang="en-US" dirty="0"/>
           </a:p>
         </p:txBody>
       </p:sp>
@@ -2112,9 +2624,9 @@
           <a:p>
             <a:fld id="{D341B595-366B-43E2-A22E-EA6A78C03F06}" type="datetimeFigureOut">
               <a:rPr lang="en-US" smtClean="0"/>
-              <a:t>12/22/2025</a:t>
+              <a:t>12/29/2025</a:t>
             </a:fld>
-            <a:endParaRPr lang="en-US"/>
+            <a:endParaRPr lang="en-US" dirty="0"/>
           </a:p>
         </p:txBody>
       </p:sp>
@@ -2133,7 +2645,7 @@
           <a:bodyPr/>
           <a:lstStyle/>
           <a:p>
-            <a:endParaRPr lang="en-US"/>
+            <a:endParaRPr lang="en-US" dirty="0"/>
           </a:p>
         </p:txBody>
       </p:sp>
@@ -2156,7 +2668,7 @@
               <a:rPr lang="en-US" smtClean="0"/>
               <a:t>‹#›</a:t>
             </a:fld>
-            <a:endParaRPr lang="en-US"/>
+            <a:endParaRPr lang="en-US" dirty="0"/>
           </a:p>
         </p:txBody>
       </p:sp>
@@ -2283,9 +2795,9 @@
           <a:p>
             <a:fld id="{D341B595-366B-43E2-A22E-EA6A78C03F06}" type="datetimeFigureOut">
               <a:rPr lang="en-US" smtClean="0"/>
-              <a:t>12/22/2025</a:t>
+              <a:t>12/29/2025</a:t>
             </a:fld>
-            <a:endParaRPr lang="en-US"/>
+            <a:endParaRPr lang="en-US" dirty="0"/>
           </a:p>
         </p:txBody>
       </p:sp>
@@ -2312,7 +2824,7 @@
             </a:lvl1pPr>
           </a:lstStyle>
           <a:p>
-            <a:endParaRPr lang="en-US"/>
+            <a:endParaRPr lang="en-US" dirty="0"/>
           </a:p>
         </p:txBody>
       </p:sp>
@@ -2335,7 +2847,7 @@
               <a:rPr lang="en-US" smtClean="0"/>
               <a:t>‹#›</a:t>
             </a:fld>
-            <a:endParaRPr lang="en-US"/>
+            <a:endParaRPr lang="en-US" dirty="0"/>
           </a:p>
         </p:txBody>
       </p:sp>
@@ -2637,9 +3149,9 @@
           <a:p>
             <a:fld id="{D341B595-366B-43E2-A22E-EA6A78C03F06}" type="datetimeFigureOut">
               <a:rPr lang="en-US" smtClean="0"/>
-              <a:t>12/22/2025</a:t>
+              <a:t>12/29/2025</a:t>
             </a:fld>
-            <a:endParaRPr lang="en-US"/>
+            <a:endParaRPr lang="en-US" dirty="0"/>
           </a:p>
         </p:txBody>
       </p:sp>
@@ -2671,7 +3183,7 @@
             </a:lvl1pPr>
           </a:lstStyle>
           <a:p>
-            <a:endParaRPr lang="en-US"/>
+            <a:endParaRPr lang="en-US" dirty="0"/>
           </a:p>
         </p:txBody>
       </p:sp>
@@ -2702,7 +3214,7 @@
               <a:rPr lang="en-US" smtClean="0"/>
               <a:t>‹#›</a:t>
             </a:fld>
-            <a:endParaRPr lang="en-US"/>
+            <a:endParaRPr lang="en-US" dirty="0"/>
           </a:p>
         </p:txBody>
       </p:sp>
@@ -2918,10 +3430,9 @@
           </a:lstStyle>
           <a:p>
             <a:r>
-              <a:rPr lang="en-US"/>
+              <a:rPr lang="en-US" dirty="0"/>
               <a:t>Click icon to add picture</a:t>
             </a:r>
-            <a:endParaRPr lang="en-US" dirty="0"/>
           </a:p>
         </p:txBody>
       </p:sp>
@@ -3019,9 +3530,9 @@
           <a:p>
             <a:fld id="{D341B595-366B-43E2-A22E-EA6A78C03F06}" type="datetimeFigureOut">
               <a:rPr lang="en-US" smtClean="0"/>
-              <a:t>12/22/2025</a:t>
+              <a:t>12/29/2025</a:t>
             </a:fld>
-            <a:endParaRPr lang="en-US"/>
+            <a:endParaRPr lang="en-US" dirty="0"/>
           </a:p>
         </p:txBody>
       </p:sp>
@@ -3040,7 +3551,7 @@
           <a:bodyPr/>
           <a:lstStyle/>
           <a:p>
-            <a:endParaRPr lang="en-US"/>
+            <a:endParaRPr lang="en-US" dirty="0"/>
           </a:p>
         </p:txBody>
       </p:sp>
@@ -3063,7 +3574,7 @@
               <a:rPr lang="en-US" smtClean="0"/>
               <a:t>‹#›</a:t>
             </a:fld>
-            <a:endParaRPr lang="en-US"/>
+            <a:endParaRPr lang="en-US" dirty="0"/>
           </a:p>
         </p:txBody>
       </p:sp>
@@ -3143,7 +3654,7 @@
           <a:bodyPr/>
           <a:lstStyle/>
           <a:p>
-            <a:endParaRPr lang="en-US"/>
+            <a:endParaRPr lang="en-US" dirty="0"/>
           </a:p>
         </p:txBody>
       </p:sp>
@@ -3188,7 +3699,7 @@
           <a:bodyPr/>
           <a:lstStyle/>
           <a:p>
-            <a:endParaRPr lang="en-US"/>
+            <a:endParaRPr lang="en-US" dirty="0"/>
           </a:p>
         </p:txBody>
       </p:sp>
@@ -3320,9 +3831,9 @@
           <a:p>
             <a:fld id="{D341B595-366B-43E2-A22E-EA6A78C03F06}" type="datetimeFigureOut">
               <a:rPr lang="en-US" smtClean="0"/>
-              <a:t>12/22/2025</a:t>
+              <a:t>12/29/2025</a:t>
             </a:fld>
-            <a:endParaRPr lang="en-US"/>
+            <a:endParaRPr lang="en-US" dirty="0"/>
           </a:p>
         </p:txBody>
       </p:sp>
@@ -3357,7 +3868,7 @@
             </a:lvl1pPr>
           </a:lstStyle>
           <a:p>
-            <a:endParaRPr lang="en-US"/>
+            <a:endParaRPr lang="en-US" dirty="0"/>
           </a:p>
         </p:txBody>
       </p:sp>
@@ -3396,7 +3907,7 @@
               <a:rPr lang="en-US" smtClean="0"/>
               <a:t>‹#›</a:t>
             </a:fld>
-            <a:endParaRPr lang="en-US"/>
+            <a:endParaRPr lang="en-US" dirty="0"/>
           </a:p>
         </p:txBody>
       </p:sp>
@@ -4147,7 +4658,7 @@
           <a:bodyPr/>
           <a:lstStyle/>
           <a:p>
-            <a:endParaRPr lang="en-US"/>
+            <a:endParaRPr lang="en-US" dirty="0"/>
           </a:p>
         </p:txBody>
       </p:sp>
@@ -4209,7 +4720,7 @@
           <a:bodyPr/>
           <a:lstStyle/>
           <a:p>
-            <a:endParaRPr lang="en-US"/>
+            <a:endParaRPr lang="en-US" dirty="0"/>
           </a:p>
         </p:txBody>
       </p:sp>
@@ -4399,7 +4910,7 @@
           <a:lstStyle/>
           <a:p>
             <a:pPr algn="ctr"/>
-            <a:endParaRPr lang="en-US"/>
+            <a:endParaRPr lang="en-US" dirty="0"/>
           </a:p>
         </p:txBody>
       </p:sp>
@@ -4461,7 +4972,7 @@
           <a:bodyPr/>
           <a:lstStyle/>
           <a:p>
-            <a:endParaRPr lang="en-US"/>
+            <a:endParaRPr lang="en-US" dirty="0"/>
           </a:p>
         </p:txBody>
       </p:sp>
@@ -4565,7 +5076,7 @@
           <a:bodyPr/>
           <a:lstStyle/>
           <a:p>
-            <a:endParaRPr lang="en-US"/>
+            <a:endParaRPr lang="en-US" dirty="0"/>
           </a:p>
         </p:txBody>
       </p:sp>
@@ -5075,40 +5586,52 @@
           <a:lstStyle/>
           <a:p>
             <a:r>
-              <a:rPr lang="en-US" dirty="0"/>
+              <a:rPr lang="en-US" dirty="0">
+                <a:solidFill>
+                  <a:schemeClr val="accent2">
+                    <a:lumMod val="50000"/>
+                  </a:schemeClr>
+                </a:solidFill>
+              </a:rPr>
               <a:t>Most Popular Titles</a:t>
             </a:r>
           </a:p>
         </p:txBody>
       </p:sp>
-      <p:sp>
-        <p:nvSpPr>
-          <p:cNvPr id="3" name="Content Placeholder 2">
+      <p:pic>
+        <p:nvPicPr>
+          <p:cNvPr id="6" name="Content Placeholder 5">
             <a:extLst>
               <a:ext uri="{FF2B5EF4-FFF2-40B4-BE49-F238E27FC236}">
-                <a16:creationId xmlns:a16="http://schemas.microsoft.com/office/drawing/2014/main" id="{8BAA0DD8-B699-40E9-D02F-F6EA552C0236}"/>
+                <a16:creationId xmlns:a16="http://schemas.microsoft.com/office/drawing/2014/main" id="{C20A24F9-C658-B0D8-FD25-7B886B451F2E}"/>
               </a:ext>
             </a:extLst>
           </p:cNvPr>
-          <p:cNvSpPr>
-            <a:spLocks noGrp="1"/>
-          </p:cNvSpPr>
+          <p:cNvPicPr>
+            <a:picLocks noGrp="1" noChangeAspect="1"/>
+          </p:cNvPicPr>
           <p:nvPr>
             <p:ph sz="half" idx="1"/>
           </p:nvPr>
-        </p:nvSpPr>
-        <p:spPr/>
-        <p:txBody>
-          <a:bodyPr/>
-          <a:lstStyle/>
-          <a:p>
-            <a:r>
-              <a:rPr lang="en-US" dirty="0"/>
-              <a:t>Top 10 Most Popular Titles overall</a:t>
-            </a:r>
-          </a:p>
-        </p:txBody>
-      </p:sp>
+        </p:nvPicPr>
+        <p:blipFill>
+          <a:blip r:embed="rId2">
+            <a:extLst>
+              <a:ext uri="{28A0092B-C50C-407E-A947-70E740481C1C}">
+                <a14:useLocalDpi xmlns:a14="http://schemas.microsoft.com/office/drawing/2010/main" val="0"/>
+              </a:ext>
+            </a:extLst>
+          </a:blip>
+          <a:srcRect/>
+          <a:stretch/>
+        </p:blipFill>
+        <p:spPr>
+          <a:xfrm>
+            <a:off x="1096963" y="2005608"/>
+            <a:ext cx="6439618" cy="3704034"/>
+          </a:xfrm>
+        </p:spPr>
+      </p:pic>
       <p:sp>
         <p:nvSpPr>
           <p:cNvPr id="4" name="Content Placeholder 3">
@@ -5125,14 +5648,92 @@
             <p:ph sz="half" idx="2"/>
           </p:nvPr>
         </p:nvSpPr>
-        <p:spPr/>
-        <p:txBody>
-          <a:bodyPr/>
-          <a:lstStyle/>
-          <a:p>
-            <a:r>
-              <a:rPr lang="en-US" dirty="0"/>
-              <a:t>Most Popular Avg Checkouts</a:t>
+        <p:spPr>
+          <a:xfrm>
+            <a:off x="7632834" y="1845945"/>
+            <a:ext cx="3898231" cy="4023360"/>
+          </a:xfrm>
+        </p:spPr>
+        <p:txBody>
+          <a:bodyPr>
+            <a:normAutofit fontScale="92500" lnSpcReduction="10000"/>
+          </a:bodyPr>
+          <a:lstStyle/>
+          <a:p>
+            <a:pPr marL="0" indent="0">
+              <a:buNone/>
+            </a:pPr>
+            <a:r>
+              <a:rPr lang="en-US" dirty="0">
+                <a:solidFill>
+                  <a:schemeClr val="accent2">
+                    <a:lumMod val="75000"/>
+                  </a:schemeClr>
+                </a:solidFill>
+              </a:rPr>
+              <a:t>The top ten most checked-out children’s books were dominated by the Harry Potter series.</a:t>
+            </a:r>
+          </a:p>
+          <a:p>
+            <a:pPr marL="0" indent="0">
+              <a:buNone/>
+            </a:pPr>
+            <a:r>
+              <a:rPr lang="en-US" dirty="0">
+                <a:solidFill>
+                  <a:schemeClr val="accent2">
+                    <a:lumMod val="75000"/>
+                  </a:schemeClr>
+                </a:solidFill>
+              </a:rPr>
+              <a:t>In addition to readers’ preferences, these most popular titles may benefit from being available during the entirety of the covered time period, or from having more copies available in the library system.</a:t>
+            </a:r>
+          </a:p>
+          <a:p>
+            <a:pPr marL="0" indent="0">
+              <a:buNone/>
+            </a:pPr>
+            <a:endParaRPr lang="en-US" dirty="0">
+              <a:solidFill>
+                <a:schemeClr val="accent2">
+                  <a:lumMod val="75000"/>
+                </a:schemeClr>
+              </a:solidFill>
+            </a:endParaRPr>
+          </a:p>
+          <a:p>
+            <a:pPr marL="0" indent="0">
+              <a:buNone/>
+            </a:pPr>
+            <a:r>
+              <a:rPr lang="en-US" dirty="0">
+                <a:solidFill>
+                  <a:schemeClr val="accent2">
+                    <a:lumMod val="75000"/>
+                  </a:schemeClr>
+                </a:solidFill>
+              </a:rPr>
+              <a:t>Mo Willems’ </a:t>
+            </a:r>
+            <a:r>
+              <a:rPr lang="en-US" i="1" dirty="0">
+                <a:solidFill>
+                  <a:schemeClr val="accent2">
+                    <a:lumMod val="75000"/>
+                  </a:schemeClr>
+                </a:solidFill>
+              </a:rPr>
+              <a:t>Are You Ready to Play Outside?</a:t>
+            </a:r>
+            <a:r>
+              <a:rPr lang="en-US" dirty="0">
+                <a:solidFill>
+                  <a:schemeClr val="accent2">
+                    <a:lumMod val="75000"/>
+                  </a:schemeClr>
+                </a:solidFill>
+              </a:rPr>
+              <a:t> is an interesting outlier in this top ten – it’s the only picture book, and the only one with no digital checkouts!</a:t>
             </a:r>
           </a:p>
         </p:txBody>
@@ -5155,13 +5756,7 @@
   <p:cSld>
     <p:spTree>
       <p:nvGrpSpPr>
-        <p:cNvPr id="1" name="">
-          <a:extLst>
-            <a:ext uri="{FF2B5EF4-FFF2-40B4-BE49-F238E27FC236}">
-              <a16:creationId xmlns:a16="http://schemas.microsoft.com/office/drawing/2014/main" id="{49327722-CB38-3FE3-4968-3E8C8D2A94D3}"/>
-            </a:ext>
-          </a:extLst>
-        </p:cNvPr>
+        <p:cNvPr id="1" name=""/>
         <p:cNvGrpSpPr/>
         <p:nvPr/>
       </p:nvGrpSpPr>
@@ -5178,7 +5773,7 @@
           <p:cNvPr id="2" name="Title 1">
             <a:extLst>
               <a:ext uri="{FF2B5EF4-FFF2-40B4-BE49-F238E27FC236}">
-                <a16:creationId xmlns:a16="http://schemas.microsoft.com/office/drawing/2014/main" id="{294BFEFB-F726-3942-5379-96988F90E55A}"/>
+                <a16:creationId xmlns:a16="http://schemas.microsoft.com/office/drawing/2014/main" id="{1BC8C573-1CE1-5645-5AAD-869A929D0630}"/>
               </a:ext>
             </a:extLst>
           </p:cNvPr>
@@ -5195,46 +5790,58 @@
           <a:lstStyle/>
           <a:p>
             <a:r>
-              <a:rPr lang="en-US" dirty="0"/>
-              <a:t>Most Popular Authors</a:t>
-            </a:r>
-          </a:p>
-        </p:txBody>
-      </p:sp>
-      <p:sp>
-        <p:nvSpPr>
-          <p:cNvPr id="3" name="Content Placeholder 2">
+              <a:rPr lang="en-US" dirty="0">
+                <a:solidFill>
+                  <a:schemeClr val="accent2">
+                    <a:lumMod val="50000"/>
+                  </a:schemeClr>
+                </a:solidFill>
+              </a:rPr>
+              <a:t>Different Demand Patterns</a:t>
+            </a:r>
+          </a:p>
+        </p:txBody>
+      </p:sp>
+      <p:pic>
+        <p:nvPicPr>
+          <p:cNvPr id="6" name="Content Placeholder 5">
             <a:extLst>
               <a:ext uri="{FF2B5EF4-FFF2-40B4-BE49-F238E27FC236}">
-                <a16:creationId xmlns:a16="http://schemas.microsoft.com/office/drawing/2014/main" id="{2598DD60-603E-6EF8-3464-AF56CC68983C}"/>
+                <a16:creationId xmlns:a16="http://schemas.microsoft.com/office/drawing/2014/main" id="{8DA968D3-05A2-CC76-C778-D1F1495E5FEF}"/>
               </a:ext>
             </a:extLst>
           </p:cNvPr>
-          <p:cNvSpPr>
-            <a:spLocks noGrp="1"/>
-          </p:cNvSpPr>
+          <p:cNvPicPr>
+            <a:picLocks noGrp="1" noChangeAspect="1"/>
+          </p:cNvPicPr>
           <p:nvPr>
             <p:ph sz="half" idx="1"/>
           </p:nvPr>
-        </p:nvSpPr>
-        <p:spPr/>
-        <p:txBody>
-          <a:bodyPr/>
-          <a:lstStyle/>
-          <a:p>
-            <a:r>
-              <a:rPr lang="en-US" dirty="0"/>
-              <a:t>Top 10 by overall checkouts</a:t>
-            </a:r>
-          </a:p>
-        </p:txBody>
-      </p:sp>
+        </p:nvPicPr>
+        <p:blipFill>
+          <a:blip r:embed="rId2">
+            <a:extLst>
+              <a:ext uri="{28A0092B-C50C-407E-A947-70E740481C1C}">
+                <a14:useLocalDpi xmlns:a14="http://schemas.microsoft.com/office/drawing/2010/main" val="0"/>
+              </a:ext>
+            </a:extLst>
+          </a:blip>
+          <a:srcRect/>
+          <a:stretch/>
+        </p:blipFill>
+        <p:spPr>
+          <a:xfrm>
+            <a:off x="3926491" y="1571625"/>
+            <a:ext cx="7753605" cy="3101441"/>
+          </a:xfrm>
+        </p:spPr>
+      </p:pic>
       <p:sp>
         <p:nvSpPr>
           <p:cNvPr id="4" name="Content Placeholder 3">
             <a:extLst>
               <a:ext uri="{FF2B5EF4-FFF2-40B4-BE49-F238E27FC236}">
-                <a16:creationId xmlns:a16="http://schemas.microsoft.com/office/drawing/2014/main" id="{27CEDEEE-4E91-D4A0-1DC1-0127147A095A}"/>
+                <a16:creationId xmlns:a16="http://schemas.microsoft.com/office/drawing/2014/main" id="{93E0AE34-F69A-5900-5C10-CBF49234D2A7}"/>
               </a:ext>
             </a:extLst>
           </p:cNvPr>
@@ -5245,25 +5852,368 @@
             <p:ph sz="half" idx="2"/>
           </p:nvPr>
         </p:nvSpPr>
-        <p:spPr/>
-        <p:txBody>
-          <a:bodyPr/>
-          <a:lstStyle/>
-          <a:p>
-            <a:r>
-              <a:rPr lang="en-US" dirty="0"/>
-              <a:t>By avg checkouts per month</a:t>
-            </a:r>
-          </a:p>
-          <a:p>
-            <a:endParaRPr lang="en-US" dirty="0"/>
+        <p:spPr>
+          <a:xfrm>
+            <a:off x="1179195" y="4805464"/>
+            <a:ext cx="10221621" cy="1874016"/>
+          </a:xfrm>
+        </p:spPr>
+        <p:txBody>
+          <a:bodyPr>
+            <a:normAutofit/>
+          </a:bodyPr>
+          <a:lstStyle/>
+          <a:p>
+            <a:r>
+              <a:rPr lang="en-US" sz="1800" b="1" dirty="0">
+                <a:solidFill>
+                  <a:schemeClr val="accent2">
+                    <a:lumMod val="75000"/>
+                  </a:schemeClr>
+                </a:solidFill>
+              </a:rPr>
+              <a:t>Harry Potter and the Order of the Phoenix</a:t>
+            </a:r>
+            <a:r>
+              <a:rPr lang="en-US" sz="1800" dirty="0">
+                <a:solidFill>
+                  <a:schemeClr val="accent2">
+                    <a:lumMod val="75000"/>
+                  </a:schemeClr>
+                </a:solidFill>
+              </a:rPr>
+              <a:t>, the seventh most popular book overall, has had steady checkouts for the entire time frame except for periods where the library did not have digital copies available.</a:t>
+            </a:r>
+          </a:p>
+          <a:p>
+            <a:r>
+              <a:rPr lang="en-US" sz="1800" b="1" dirty="0">
+                <a:solidFill>
+                  <a:schemeClr val="accent2">
+                    <a:lumMod val="75000"/>
+                  </a:schemeClr>
+                </a:solidFill>
+              </a:rPr>
+              <a:t>Wonder</a:t>
+            </a:r>
+            <a:r>
+              <a:rPr lang="en-US" sz="1800" dirty="0">
+                <a:solidFill>
+                  <a:schemeClr val="accent2">
+                    <a:lumMod val="75000"/>
+                  </a:schemeClr>
+                </a:solidFill>
+              </a:rPr>
+              <a:t>, the eighth most popular, appears after its publication in 2012 and then experiences a dramatic spike in checkouts after the movie adaptation in 2017.</a:t>
+            </a:r>
+            <a:endParaRPr lang="en-US" sz="1800" b="1" dirty="0">
+              <a:solidFill>
+                <a:schemeClr val="accent2">
+                  <a:lumMod val="75000"/>
+                </a:schemeClr>
+              </a:solidFill>
+            </a:endParaRPr>
+          </a:p>
+        </p:txBody>
+      </p:sp>
+      <p:sp>
+        <p:nvSpPr>
+          <p:cNvPr id="7" name="Content Placeholder 3">
+            <a:extLst>
+              <a:ext uri="{FF2B5EF4-FFF2-40B4-BE49-F238E27FC236}">
+                <a16:creationId xmlns:a16="http://schemas.microsoft.com/office/drawing/2014/main" id="{9E53BAAC-A4D9-6C41-784B-148E0D12A57A}"/>
+              </a:ext>
+            </a:extLst>
+          </p:cNvPr>
+          <p:cNvSpPr txBox="1">
+            <a:spLocks/>
+          </p:cNvSpPr>
+          <p:nvPr/>
+        </p:nvSpPr>
+        <p:spPr>
+          <a:xfrm>
+            <a:off x="1179195" y="2052536"/>
+            <a:ext cx="3100976" cy="3840582"/>
+          </a:xfrm>
+          <a:prstGeom prst="rect">
+            <a:avLst/>
+          </a:prstGeom>
+        </p:spPr>
+        <p:txBody>
+          <a:bodyPr vert="horz" lIns="0" tIns="45720" rIns="0" bIns="45720" rtlCol="0">
+            <a:normAutofit/>
+          </a:bodyPr>
+          <a:lstStyle>
+            <a:lvl1pPr marL="91440" indent="-91440" algn="l" defTabSz="914400" rtl="0" eaLnBrk="1" latinLnBrk="0" hangingPunct="1">
+              <a:lnSpc>
+                <a:spcPct val="90000"/>
+              </a:lnSpc>
+              <a:spcBef>
+                <a:spcPts val="1200"/>
+              </a:spcBef>
+              <a:spcAft>
+                <a:spcPts val="200"/>
+              </a:spcAft>
+              <a:buClr>
+                <a:schemeClr val="accent1"/>
+              </a:buClr>
+              <a:buSzPct val="100000"/>
+              <a:buFont typeface="Calibri" panose="020F0502020204030204" pitchFamily="34" charset="0"/>
+              <a:buChar char=" "/>
+              <a:defRPr sz="2000" kern="1200">
+                <a:solidFill>
+                  <a:schemeClr val="tx1">
+                    <a:lumMod val="75000"/>
+                    <a:lumOff val="25000"/>
+                  </a:schemeClr>
+                </a:solidFill>
+                <a:latin typeface="+mn-lt"/>
+                <a:ea typeface="+mn-ea"/>
+                <a:cs typeface="+mn-cs"/>
+              </a:defRPr>
+            </a:lvl1pPr>
+            <a:lvl2pPr marL="384048" indent="-182880" algn="l" defTabSz="914400" rtl="0" eaLnBrk="1" latinLnBrk="0" hangingPunct="1">
+              <a:lnSpc>
+                <a:spcPct val="90000"/>
+              </a:lnSpc>
+              <a:spcBef>
+                <a:spcPts val="200"/>
+              </a:spcBef>
+              <a:spcAft>
+                <a:spcPts val="400"/>
+              </a:spcAft>
+              <a:buClr>
+                <a:schemeClr val="accent1"/>
+              </a:buClr>
+              <a:buFont typeface="Calibri" pitchFamily="34" charset="0"/>
+              <a:buChar char="◦"/>
+              <a:defRPr sz="1800" kern="1200">
+                <a:solidFill>
+                  <a:schemeClr val="tx1">
+                    <a:lumMod val="75000"/>
+                    <a:lumOff val="25000"/>
+                  </a:schemeClr>
+                </a:solidFill>
+                <a:latin typeface="+mn-lt"/>
+                <a:ea typeface="+mn-ea"/>
+                <a:cs typeface="+mn-cs"/>
+              </a:defRPr>
+            </a:lvl2pPr>
+            <a:lvl3pPr marL="566928" indent="-182880" algn="l" defTabSz="914400" rtl="0" eaLnBrk="1" latinLnBrk="0" hangingPunct="1">
+              <a:lnSpc>
+                <a:spcPct val="90000"/>
+              </a:lnSpc>
+              <a:spcBef>
+                <a:spcPts val="200"/>
+              </a:spcBef>
+              <a:spcAft>
+                <a:spcPts val="400"/>
+              </a:spcAft>
+              <a:buClr>
+                <a:schemeClr val="accent1"/>
+              </a:buClr>
+              <a:buFont typeface="Calibri" pitchFamily="34" charset="0"/>
+              <a:buChar char="◦"/>
+              <a:defRPr sz="1400" kern="1200">
+                <a:solidFill>
+                  <a:schemeClr val="tx1">
+                    <a:lumMod val="75000"/>
+                    <a:lumOff val="25000"/>
+                  </a:schemeClr>
+                </a:solidFill>
+                <a:latin typeface="+mn-lt"/>
+                <a:ea typeface="+mn-ea"/>
+                <a:cs typeface="+mn-cs"/>
+              </a:defRPr>
+            </a:lvl3pPr>
+            <a:lvl4pPr marL="749808" indent="-182880" algn="l" defTabSz="914400" rtl="0" eaLnBrk="1" latinLnBrk="0" hangingPunct="1">
+              <a:lnSpc>
+                <a:spcPct val="90000"/>
+              </a:lnSpc>
+              <a:spcBef>
+                <a:spcPts val="200"/>
+              </a:spcBef>
+              <a:spcAft>
+                <a:spcPts val="400"/>
+              </a:spcAft>
+              <a:buClr>
+                <a:schemeClr val="accent1"/>
+              </a:buClr>
+              <a:buFont typeface="Calibri" pitchFamily="34" charset="0"/>
+              <a:buChar char="◦"/>
+              <a:defRPr sz="1400" kern="1200">
+                <a:solidFill>
+                  <a:schemeClr val="tx1">
+                    <a:lumMod val="75000"/>
+                    <a:lumOff val="25000"/>
+                  </a:schemeClr>
+                </a:solidFill>
+                <a:latin typeface="+mn-lt"/>
+                <a:ea typeface="+mn-ea"/>
+                <a:cs typeface="+mn-cs"/>
+              </a:defRPr>
+            </a:lvl4pPr>
+            <a:lvl5pPr marL="932688" indent="-182880" algn="l" defTabSz="914400" rtl="0" eaLnBrk="1" latinLnBrk="0" hangingPunct="1">
+              <a:lnSpc>
+                <a:spcPct val="90000"/>
+              </a:lnSpc>
+              <a:spcBef>
+                <a:spcPts val="200"/>
+              </a:spcBef>
+              <a:spcAft>
+                <a:spcPts val="400"/>
+              </a:spcAft>
+              <a:buClr>
+                <a:schemeClr val="accent1"/>
+              </a:buClr>
+              <a:buFont typeface="Calibri" pitchFamily="34" charset="0"/>
+              <a:buChar char="◦"/>
+              <a:defRPr sz="1400" kern="1200">
+                <a:solidFill>
+                  <a:schemeClr val="tx1">
+                    <a:lumMod val="75000"/>
+                    <a:lumOff val="25000"/>
+                  </a:schemeClr>
+                </a:solidFill>
+                <a:latin typeface="+mn-lt"/>
+                <a:ea typeface="+mn-ea"/>
+                <a:cs typeface="+mn-cs"/>
+              </a:defRPr>
+            </a:lvl5pPr>
+            <a:lvl6pPr marL="1100000" indent="-228600" algn="l" defTabSz="914400" rtl="0" eaLnBrk="1" latinLnBrk="0" hangingPunct="1">
+              <a:lnSpc>
+                <a:spcPct val="90000"/>
+              </a:lnSpc>
+              <a:spcBef>
+                <a:spcPts val="200"/>
+              </a:spcBef>
+              <a:spcAft>
+                <a:spcPts val="400"/>
+              </a:spcAft>
+              <a:buClr>
+                <a:schemeClr val="accent1"/>
+              </a:buClr>
+              <a:buFont typeface="Calibri" pitchFamily="34" charset="0"/>
+              <a:buChar char="◦"/>
+              <a:defRPr sz="1400" kern="1200">
+                <a:solidFill>
+                  <a:schemeClr val="tx1">
+                    <a:lumMod val="75000"/>
+                    <a:lumOff val="25000"/>
+                  </a:schemeClr>
+                </a:solidFill>
+                <a:latin typeface="+mn-lt"/>
+                <a:ea typeface="+mn-ea"/>
+                <a:cs typeface="+mn-cs"/>
+              </a:defRPr>
+            </a:lvl6pPr>
+            <a:lvl7pPr marL="1300000" indent="-228600" algn="l" defTabSz="914400" rtl="0" eaLnBrk="1" latinLnBrk="0" hangingPunct="1">
+              <a:lnSpc>
+                <a:spcPct val="90000"/>
+              </a:lnSpc>
+              <a:spcBef>
+                <a:spcPts val="200"/>
+              </a:spcBef>
+              <a:spcAft>
+                <a:spcPts val="400"/>
+              </a:spcAft>
+              <a:buClr>
+                <a:schemeClr val="accent1"/>
+              </a:buClr>
+              <a:buFont typeface="Calibri" pitchFamily="34" charset="0"/>
+              <a:buChar char="◦"/>
+              <a:defRPr sz="1400" kern="1200">
+                <a:solidFill>
+                  <a:schemeClr val="tx1">
+                    <a:lumMod val="75000"/>
+                    <a:lumOff val="25000"/>
+                  </a:schemeClr>
+                </a:solidFill>
+                <a:latin typeface="+mn-lt"/>
+                <a:ea typeface="+mn-ea"/>
+                <a:cs typeface="+mn-cs"/>
+              </a:defRPr>
+            </a:lvl7pPr>
+            <a:lvl8pPr marL="1500000" indent="-228600" algn="l" defTabSz="914400" rtl="0" eaLnBrk="1" latinLnBrk="0" hangingPunct="1">
+              <a:lnSpc>
+                <a:spcPct val="90000"/>
+              </a:lnSpc>
+              <a:spcBef>
+                <a:spcPts val="200"/>
+              </a:spcBef>
+              <a:spcAft>
+                <a:spcPts val="400"/>
+              </a:spcAft>
+              <a:buClr>
+                <a:schemeClr val="accent1"/>
+              </a:buClr>
+              <a:buFont typeface="Calibri" pitchFamily="34" charset="0"/>
+              <a:buChar char="◦"/>
+              <a:defRPr sz="1400" kern="1200">
+                <a:solidFill>
+                  <a:schemeClr val="tx1">
+                    <a:lumMod val="75000"/>
+                    <a:lumOff val="25000"/>
+                  </a:schemeClr>
+                </a:solidFill>
+                <a:latin typeface="+mn-lt"/>
+                <a:ea typeface="+mn-ea"/>
+                <a:cs typeface="+mn-cs"/>
+              </a:defRPr>
+            </a:lvl8pPr>
+            <a:lvl9pPr marL="1700000" indent="-228600" algn="l" defTabSz="914400" rtl="0" eaLnBrk="1" latinLnBrk="0" hangingPunct="1">
+              <a:lnSpc>
+                <a:spcPct val="90000"/>
+              </a:lnSpc>
+              <a:spcBef>
+                <a:spcPts val="200"/>
+              </a:spcBef>
+              <a:spcAft>
+                <a:spcPts val="400"/>
+              </a:spcAft>
+              <a:buClr>
+                <a:schemeClr val="accent1"/>
+              </a:buClr>
+              <a:buFont typeface="Calibri" pitchFamily="34" charset="0"/>
+              <a:buChar char="◦"/>
+              <a:defRPr sz="1400" kern="1200">
+                <a:solidFill>
+                  <a:schemeClr val="tx1">
+                    <a:lumMod val="75000"/>
+                    <a:lumOff val="25000"/>
+                  </a:schemeClr>
+                </a:solidFill>
+                <a:latin typeface="+mn-lt"/>
+                <a:ea typeface="+mn-ea"/>
+                <a:cs typeface="+mn-cs"/>
+              </a:defRPr>
+            </a:lvl9pPr>
+          </a:lstStyle>
+          <a:p>
+            <a:r>
+              <a:rPr lang="en-US" dirty="0">
+                <a:solidFill>
+                  <a:schemeClr val="accent2">
+                    <a:lumMod val="75000"/>
+                  </a:schemeClr>
+                </a:solidFill>
+              </a:rPr>
+              <a:t>Looking at checkout numbers over time for a few of the top titles reveal that despite similar overall checkout numbers, titles can experience very different patterns in checkouts.</a:t>
+            </a:r>
+            <a:endParaRPr lang="en-US" b="1" dirty="0">
+              <a:solidFill>
+                <a:schemeClr val="accent2">
+                  <a:lumMod val="75000"/>
+                </a:schemeClr>
+              </a:solidFill>
+            </a:endParaRPr>
           </a:p>
         </p:txBody>
       </p:sp>
     </p:spTree>
     <p:extLst>
       <p:ext uri="{BB962C8B-B14F-4D97-AF65-F5344CB8AC3E}">
-        <p14:creationId xmlns:p14="http://schemas.microsoft.com/office/powerpoint/2010/main" val="1022351169"/>
+        <p14:creationId xmlns:p14="http://schemas.microsoft.com/office/powerpoint/2010/main" val="534972039"/>
       </p:ext>
     </p:extLst>
   </p:cSld>
@@ -5276,6 +6226,14 @@
 <file path=ppt/slides/slide6.xml><?xml version="1.0" encoding="utf-8"?>
 <p:sld xmlns:a="http://schemas.openxmlformats.org/drawingml/2006/main" xmlns:r="http://schemas.openxmlformats.org/officeDocument/2006/relationships" xmlns:p="http://schemas.openxmlformats.org/presentationml/2006/main">
   <p:cSld>
+    <p:bg>
+      <p:bgPr>
+        <a:solidFill>
+          <a:schemeClr val="bg1"/>
+        </a:solidFill>
+        <a:effectLst/>
+      </p:bgPr>
+    </p:bg>
     <p:spTree>
       <p:nvGrpSpPr>
         <p:cNvPr id="1" name=""/>
@@ -5292,10 +6250,249 @@
       </p:grpSpPr>
       <p:sp>
         <p:nvSpPr>
+          <p:cNvPr id="28" name="Rectangle 27">
+            <a:extLst>
+              <a:ext uri="{FF2B5EF4-FFF2-40B4-BE49-F238E27FC236}">
+                <a16:creationId xmlns:a16="http://schemas.microsoft.com/office/drawing/2014/main" id="{600B5AE2-C5CC-499C-8F2D-249888BE22C2}"/>
+              </a:ext>
+              <a:ext uri="{C183D7F6-B498-43B3-948B-1728B52AA6E4}">
+                <adec:decorative xmlns:adec="http://schemas.microsoft.com/office/drawing/2017/decorative" val="1"/>
+              </a:ext>
+            </a:extLst>
+          </p:cNvPr>
+          <p:cNvSpPr>
+            <a:spLocks noGrp="1" noRot="1" noChangeAspect="1" noMove="1" noResize="1" noEditPoints="1" noAdjustHandles="1" noChangeArrowheads="1" noChangeShapeType="1" noTextEdit="1"/>
+          </p:cNvSpPr>
+          <p:nvPr>
+            <p:extLst>
+              <p:ext uri="{386F3935-93C4-4BCD-93E2-E3B085C9AB24}">
+                <p16:designElem xmlns:p16="http://schemas.microsoft.com/office/powerpoint/2015/main" val="1"/>
+              </p:ext>
+            </p:extLst>
+          </p:nvPr>
+        </p:nvSpPr>
+        <p:spPr>
+          <a:xfrm>
+            <a:off x="1" y="6400800"/>
+            <a:ext cx="12192000" cy="457200"/>
+          </a:xfrm>
+          <a:prstGeom prst="rect">
+            <a:avLst/>
+          </a:prstGeom>
+          <a:solidFill>
+            <a:schemeClr val="accent2"/>
+          </a:solidFill>
+          <a:ln>
+            <a:noFill/>
+          </a:ln>
+        </p:spPr>
+        <p:style>
+          <a:lnRef idx="2">
+            <a:schemeClr val="accent1">
+              <a:shade val="50000"/>
+            </a:schemeClr>
+          </a:lnRef>
+          <a:fillRef idx="1">
+            <a:schemeClr val="accent1"/>
+          </a:fillRef>
+          <a:effectRef idx="0">
+            <a:schemeClr val="accent1"/>
+          </a:effectRef>
+          <a:fontRef idx="minor">
+            <a:schemeClr val="lt1"/>
+          </a:fontRef>
+        </p:style>
+        <p:txBody>
+          <a:bodyPr/>
+          <a:lstStyle/>
+          <a:p>
+            <a:endParaRPr lang="en-US"/>
+          </a:p>
+        </p:txBody>
+      </p:sp>
+      <p:sp>
+        <p:nvSpPr>
+          <p:cNvPr id="30" name="Rectangle 29">
+            <a:extLst>
+              <a:ext uri="{FF2B5EF4-FFF2-40B4-BE49-F238E27FC236}">
+                <a16:creationId xmlns:a16="http://schemas.microsoft.com/office/drawing/2014/main" id="{BA7A3698-B350-40E5-8475-9BCC41A089FC}"/>
+              </a:ext>
+              <a:ext uri="{C183D7F6-B498-43B3-948B-1728B52AA6E4}">
+                <adec:decorative xmlns:adec="http://schemas.microsoft.com/office/drawing/2017/decorative" val="1"/>
+              </a:ext>
+            </a:extLst>
+          </p:cNvPr>
+          <p:cNvSpPr>
+            <a:spLocks noGrp="1" noRot="1" noChangeAspect="1" noMove="1" noResize="1" noEditPoints="1" noAdjustHandles="1" noChangeArrowheads="1" noChangeShapeType="1" noTextEdit="1"/>
+          </p:cNvSpPr>
+          <p:nvPr>
+            <p:extLst>
+              <p:ext uri="{386F3935-93C4-4BCD-93E2-E3B085C9AB24}">
+                <p16:designElem xmlns:p16="http://schemas.microsoft.com/office/powerpoint/2015/main" val="1"/>
+              </p:ext>
+            </p:extLst>
+          </p:nvPr>
+        </p:nvSpPr>
+        <p:spPr>
+          <a:xfrm>
+            <a:off x="0" y="6334316"/>
+            <a:ext cx="12192001" cy="65998"/>
+          </a:xfrm>
+          <a:prstGeom prst="rect">
+            <a:avLst/>
+          </a:prstGeom>
+          <a:solidFill>
+            <a:schemeClr val="accent1"/>
+          </a:solidFill>
+          <a:ln>
+            <a:noFill/>
+          </a:ln>
+        </p:spPr>
+        <p:style>
+          <a:lnRef idx="2">
+            <a:schemeClr val="accent1">
+              <a:shade val="50000"/>
+            </a:schemeClr>
+          </a:lnRef>
+          <a:fillRef idx="1">
+            <a:schemeClr val="accent1"/>
+          </a:fillRef>
+          <a:effectRef idx="0">
+            <a:schemeClr val="accent1"/>
+          </a:effectRef>
+          <a:fontRef idx="minor">
+            <a:schemeClr val="lt1"/>
+          </a:fontRef>
+        </p:style>
+        <p:txBody>
+          <a:bodyPr/>
+          <a:lstStyle/>
+          <a:p>
+            <a:endParaRPr lang="en-US"/>
+          </a:p>
+        </p:txBody>
+      </p:sp>
+      <p:cxnSp>
+        <p:nvCxnSpPr>
+          <p:cNvPr id="32" name="Straight Connector 31">
+            <a:extLst>
+              <a:ext uri="{FF2B5EF4-FFF2-40B4-BE49-F238E27FC236}">
+                <a16:creationId xmlns:a16="http://schemas.microsoft.com/office/drawing/2014/main" id="{0AC655C7-EC94-4BE6-84C8-2F9EFBBB2789}"/>
+              </a:ext>
+              <a:ext uri="{C183D7F6-B498-43B3-948B-1728B52AA6E4}">
+                <adec:decorative xmlns:adec="http://schemas.microsoft.com/office/drawing/2017/decorative" val="1"/>
+              </a:ext>
+            </a:extLst>
+          </p:cNvPr>
+          <p:cNvCxnSpPr>
+            <a:cxnSpLocks noGrp="1" noRot="1" noChangeAspect="1" noMove="1" noResize="1" noEditPoints="1" noAdjustHandles="1" noChangeArrowheads="1" noChangeShapeType="1"/>
+          </p:cNvCxnSpPr>
+          <p:nvPr>
+            <p:extLst>
+              <p:ext uri="{386F3935-93C4-4BCD-93E2-E3B085C9AB24}">
+                <p16:designElem xmlns:p16="http://schemas.microsoft.com/office/powerpoint/2015/main" val="1"/>
+              </p:ext>
+            </p:extLst>
+          </p:nvPr>
+        </p:nvCxnSpPr>
+        <p:spPr>
+          <a:xfrm>
+            <a:off x="1193532" y="1737845"/>
+            <a:ext cx="9966960" cy="0"/>
+          </a:xfrm>
+          <a:prstGeom prst="line">
+            <a:avLst/>
+          </a:prstGeom>
+          <a:ln w="6350">
+            <a:solidFill>
+              <a:schemeClr val="tx1">
+                <a:lumMod val="50000"/>
+                <a:lumOff val="50000"/>
+              </a:schemeClr>
+            </a:solidFill>
+          </a:ln>
+        </p:spPr>
+        <p:style>
+          <a:lnRef idx="1">
+            <a:schemeClr val="accent1"/>
+          </a:lnRef>
+          <a:fillRef idx="0">
+            <a:schemeClr val="accent1"/>
+          </a:fillRef>
+          <a:effectRef idx="0">
+            <a:schemeClr val="accent1"/>
+          </a:effectRef>
+          <a:fontRef idx="minor">
+            <a:schemeClr val="tx1"/>
+          </a:fontRef>
+        </p:style>
+      </p:cxnSp>
+      <p:sp useBgFill="1">
+        <p:nvSpPr>
+          <p:cNvPr id="34" name="Rectangle 33">
+            <a:extLst>
+              <a:ext uri="{FF2B5EF4-FFF2-40B4-BE49-F238E27FC236}">
+                <a16:creationId xmlns:a16="http://schemas.microsoft.com/office/drawing/2014/main" id="{10162E77-11AD-44A7-84EC-40C59EEFBD2E}"/>
+              </a:ext>
+              <a:ext uri="{C183D7F6-B498-43B3-948B-1728B52AA6E4}">
+                <adec:decorative xmlns:adec="http://schemas.microsoft.com/office/drawing/2017/decorative" val="1"/>
+              </a:ext>
+            </a:extLst>
+          </p:cNvPr>
+          <p:cNvSpPr>
+            <a:spLocks noGrp="1" noRot="1" noChangeAspect="1" noMove="1" noResize="1" noEditPoints="1" noAdjustHandles="1" noChangeArrowheads="1" noChangeShapeType="1" noTextEdit="1"/>
+          </p:cNvSpPr>
+          <p:nvPr>
+            <p:extLst>
+              <p:ext uri="{386F3935-93C4-4BCD-93E2-E3B085C9AB24}">
+                <p16:designElem xmlns:p16="http://schemas.microsoft.com/office/powerpoint/2015/main" val="1"/>
+              </p:ext>
+            </p:extLst>
+          </p:nvPr>
+        </p:nvSpPr>
+        <p:spPr>
+          <a:xfrm>
+            <a:off x="0" y="0"/>
+            <a:ext cx="12192001" cy="6334316"/>
+          </a:xfrm>
+          <a:prstGeom prst="rect">
+            <a:avLst/>
+          </a:prstGeom>
+          <a:ln>
+            <a:noFill/>
+          </a:ln>
+        </p:spPr>
+        <p:style>
+          <a:lnRef idx="2">
+            <a:schemeClr val="accent1">
+              <a:shade val="50000"/>
+            </a:schemeClr>
+          </a:lnRef>
+          <a:fillRef idx="1">
+            <a:schemeClr val="accent1"/>
+          </a:fillRef>
+          <a:effectRef idx="0">
+            <a:schemeClr val="accent1"/>
+          </a:effectRef>
+          <a:fontRef idx="minor">
+            <a:schemeClr val="lt1"/>
+          </a:fontRef>
+        </p:style>
+        <p:txBody>
+          <a:bodyPr rtlCol="0" anchor="ctr"/>
+          <a:lstStyle/>
+          <a:p>
+            <a:pPr algn="ctr"/>
+            <a:endParaRPr lang="en-US"/>
+          </a:p>
+        </p:txBody>
+      </p:sp>
+      <p:sp>
+        <p:nvSpPr>
           <p:cNvPr id="2" name="Title 1">
             <a:extLst>
               <a:ext uri="{FF2B5EF4-FFF2-40B4-BE49-F238E27FC236}">
-                <a16:creationId xmlns:a16="http://schemas.microsoft.com/office/drawing/2014/main" id="{C2D9EE8A-E9C7-00CD-635D-31286291ABB3}"/>
+                <a16:creationId xmlns:a16="http://schemas.microsoft.com/office/drawing/2014/main" id="{22F6541A-E791-92AD-3011-F47D55F00336}"/>
               </a:ext>
             </a:extLst>
           </p:cNvPr>
@@ -5306,24 +6503,135 @@
             <p:ph type="title"/>
           </p:nvPr>
         </p:nvSpPr>
-        <p:spPr/>
-        <p:txBody>
-          <a:bodyPr/>
-          <a:lstStyle/>
-          <a:p>
-            <a:r>
-              <a:rPr lang="en-US" dirty="0"/>
-              <a:t>Defining “Popular”</a:t>
-            </a:r>
-          </a:p>
-        </p:txBody>
-      </p:sp>
+        <p:spPr>
+          <a:xfrm>
+            <a:off x="7859485" y="634946"/>
+            <a:ext cx="3690257" cy="1450757"/>
+          </a:xfrm>
+        </p:spPr>
+        <p:txBody>
+          <a:bodyPr vert="horz" lIns="91440" tIns="45720" rIns="91440" bIns="45720" rtlCol="0" anchor="b">
+            <a:normAutofit/>
+          </a:bodyPr>
+          <a:lstStyle/>
+          <a:p>
+            <a:r>
+              <a:rPr lang="en-US" kern="1200" spc="-50" baseline="0" dirty="0">
+                <a:solidFill>
+                  <a:schemeClr val="accent2">
+                    <a:lumMod val="50000"/>
+                  </a:schemeClr>
+                </a:solidFill>
+                <a:latin typeface="+mj-lt"/>
+                <a:ea typeface="+mj-ea"/>
+                <a:cs typeface="+mj-cs"/>
+              </a:rPr>
+              <a:t>Possible Fads</a:t>
+            </a:r>
+          </a:p>
+        </p:txBody>
+      </p:sp>
+      <p:pic>
+        <p:nvPicPr>
+          <p:cNvPr id="6" name="Content Placeholder 5">
+            <a:extLst>
+              <a:ext uri="{FF2B5EF4-FFF2-40B4-BE49-F238E27FC236}">
+                <a16:creationId xmlns:a16="http://schemas.microsoft.com/office/drawing/2014/main" id="{3EFE13C7-0C56-EA5E-8B86-F485380D357D}"/>
+              </a:ext>
+            </a:extLst>
+          </p:cNvPr>
+          <p:cNvPicPr>
+            <a:picLocks noGrp="1" noChangeAspect="1"/>
+          </p:cNvPicPr>
+          <p:nvPr>
+            <p:ph sz="half" idx="2"/>
+          </p:nvPr>
+        </p:nvPicPr>
+        <p:blipFill>
+          <a:blip r:embed="rId3">
+            <a:extLst>
+              <a:ext uri="{28A0092B-C50C-407E-A947-70E740481C1C}">
+                <a14:useLocalDpi xmlns:a14="http://schemas.microsoft.com/office/drawing/2010/main" val="0"/>
+              </a:ext>
+            </a:extLst>
+          </a:blip>
+          <a:srcRect l="-6595" r="-1160" b="-2"/>
+          <a:stretch>
+            <a:fillRect/>
+          </a:stretch>
+        </p:blipFill>
+        <p:spPr>
+          <a:xfrm>
+            <a:off x="-333375" y="1038998"/>
+            <a:ext cx="8211094" cy="4572177"/>
+          </a:xfrm>
+          <a:prstGeom prst="rect">
+            <a:avLst/>
+          </a:prstGeom>
+        </p:spPr>
+      </p:pic>
+      <p:cxnSp>
+        <p:nvCxnSpPr>
+          <p:cNvPr id="36" name="Straight Connector 35">
+            <a:extLst>
+              <a:ext uri="{FF2B5EF4-FFF2-40B4-BE49-F238E27FC236}">
+                <a16:creationId xmlns:a16="http://schemas.microsoft.com/office/drawing/2014/main" id="{5AB158E9-1B40-4CD6-95F0-95CA11DF7B7A}"/>
+              </a:ext>
+              <a:ext uri="{C183D7F6-B498-43B3-948B-1728B52AA6E4}">
+                <adec:decorative xmlns:adec="http://schemas.microsoft.com/office/drawing/2017/decorative" val="1"/>
+              </a:ext>
+            </a:extLst>
+          </p:cNvPr>
+          <p:cNvCxnSpPr>
+            <a:cxnSpLocks noGrp="1" noRot="1" noChangeAspect="1" noMove="1" noResize="1" noEditPoints="1" noAdjustHandles="1" noChangeArrowheads="1" noChangeShapeType="1"/>
+          </p:cNvCxnSpPr>
+          <p:nvPr>
+            <p:extLst>
+              <p:ext uri="{386F3935-93C4-4BCD-93E2-E3B085C9AB24}">
+                <p16:designElem xmlns:p16="http://schemas.microsoft.com/office/powerpoint/2015/main" val="1"/>
+              </p:ext>
+            </p:extLst>
+          </p:nvPr>
+        </p:nvCxnSpPr>
+        <p:spPr>
+          <a:xfrm>
+            <a:off x="7892143" y="2085703"/>
+            <a:ext cx="3566160" cy="0"/>
+          </a:xfrm>
+          <a:prstGeom prst="line">
+            <a:avLst/>
+          </a:prstGeom>
+          <a:ln w="6350">
+            <a:solidFill>
+              <a:schemeClr val="tx1">
+                <a:lumMod val="50000"/>
+                <a:lumOff val="50000"/>
+                <a:alpha val="90000"/>
+              </a:schemeClr>
+            </a:solidFill>
+          </a:ln>
+        </p:spPr>
+        <p:style>
+          <a:lnRef idx="1">
+            <a:schemeClr val="accent1"/>
+          </a:lnRef>
+          <a:fillRef idx="0">
+            <a:schemeClr val="accent1"/>
+          </a:fillRef>
+          <a:effectRef idx="0">
+            <a:schemeClr val="accent1"/>
+          </a:effectRef>
+          <a:fontRef idx="minor">
+            <a:schemeClr val="tx1"/>
+          </a:fontRef>
+        </p:style>
+      </p:cxnSp>
       <p:sp>
         <p:nvSpPr>
           <p:cNvPr id="3" name="Content Placeholder 2">
             <a:extLst>
               <a:ext uri="{FF2B5EF4-FFF2-40B4-BE49-F238E27FC236}">
-                <a16:creationId xmlns:a16="http://schemas.microsoft.com/office/drawing/2014/main" id="{89CDA909-DAD5-3EDE-482C-290B1B9A4C79}"/>
+                <a16:creationId xmlns:a16="http://schemas.microsoft.com/office/drawing/2014/main" id="{B88AB8E4-7A30-D023-91AB-7EBFF8765875}"/>
               </a:ext>
             </a:extLst>
           </p:cNvPr>
@@ -5331,31 +6639,264 @@
             <a:spLocks noGrp="1"/>
           </p:cNvSpPr>
           <p:nvPr>
-            <p:ph idx="1"/>
-          </p:nvPr>
-        </p:nvSpPr>
-        <p:spPr/>
+            <p:ph sz="half" idx="1"/>
+          </p:nvPr>
+        </p:nvSpPr>
+        <p:spPr>
+          <a:xfrm>
+            <a:off x="7859485" y="2198913"/>
+            <a:ext cx="3838144" cy="3755565"/>
+          </a:xfrm>
+        </p:spPr>
+        <p:txBody>
+          <a:bodyPr vert="horz" lIns="0" tIns="45720" rIns="0" bIns="45720" rtlCol="0">
+            <a:normAutofit fontScale="55000" lnSpcReduction="20000"/>
+          </a:bodyPr>
+          <a:lstStyle/>
+          <a:p>
+            <a:pPr>
+              <a:lnSpc>
+                <a:spcPct val="120000"/>
+              </a:lnSpc>
+            </a:pPr>
+            <a:r>
+              <a:rPr lang="en-US" sz="2900" dirty="0">
+                <a:solidFill>
+                  <a:schemeClr val="accent2">
+                    <a:lumMod val="75000"/>
+                  </a:schemeClr>
+                </a:solidFill>
+              </a:rPr>
+              <a:t>Without the spike following the film adaptation’s release, </a:t>
+            </a:r>
+            <a:r>
+              <a:rPr lang="en-US" sz="2900" b="1" dirty="0">
+                <a:solidFill>
+                  <a:schemeClr val="accent2">
+                    <a:lumMod val="75000"/>
+                  </a:schemeClr>
+                </a:solidFill>
+              </a:rPr>
+              <a:t>Wonder</a:t>
+            </a:r>
+            <a:r>
+              <a:rPr lang="en-US" sz="2900" dirty="0">
+                <a:solidFill>
+                  <a:schemeClr val="accent2">
+                    <a:lumMod val="75000"/>
+                  </a:schemeClr>
+                </a:solidFill>
+              </a:rPr>
+              <a:t> would’ve likely had around 4,000 fewer total checkouts, knocking it out of the top ten.  While it would still be pretty popular even then, looking for the largest spikes in checkouts may identify books that had brief moments of popularity that didn’t last.</a:t>
+            </a:r>
+          </a:p>
+          <a:p>
+            <a:pPr>
+              <a:lnSpc>
+                <a:spcPct val="120000"/>
+              </a:lnSpc>
+            </a:pPr>
+            <a:r>
+              <a:rPr lang="en-US" sz="2900" dirty="0">
+                <a:solidFill>
+                  <a:schemeClr val="accent2">
+                    <a:lumMod val="75000"/>
+                  </a:schemeClr>
+                </a:solidFill>
+              </a:rPr>
+              <a:t>Some titles with large spikes still maintain popularity, while others (like </a:t>
+            </a:r>
+            <a:r>
+              <a:rPr lang="en-US" sz="2900" i="1" dirty="0">
+                <a:solidFill>
+                  <a:schemeClr val="accent2">
+                    <a:lumMod val="75000"/>
+                  </a:schemeClr>
+                </a:solidFill>
+              </a:rPr>
+              <a:t>The Red Pencil</a:t>
+            </a:r>
+            <a:r>
+              <a:rPr lang="en-US" sz="2900" dirty="0">
+                <a:solidFill>
+                  <a:schemeClr val="accent2">
+                    <a:lumMod val="75000"/>
+                  </a:schemeClr>
+                </a:solidFill>
+              </a:rPr>
+              <a:t>, </a:t>
+            </a:r>
+            <a:r>
+              <a:rPr lang="en-US" sz="2900" i="1" dirty="0">
+                <a:solidFill>
+                  <a:schemeClr val="accent2">
+                    <a:lumMod val="75000"/>
+                  </a:schemeClr>
+                </a:solidFill>
+              </a:rPr>
+              <a:t>Mexikid</a:t>
+            </a:r>
+            <a:r>
+              <a:rPr lang="en-US" sz="2900" dirty="0">
+                <a:solidFill>
+                  <a:schemeClr val="accent2">
+                    <a:lumMod val="75000"/>
+                  </a:schemeClr>
+                </a:solidFill>
+              </a:rPr>
+              <a:t>, and </a:t>
+            </a:r>
+            <a:r>
+              <a:rPr lang="en-US" sz="2900" i="1" dirty="0">
+                <a:solidFill>
+                  <a:schemeClr val="accent2">
+                    <a:lumMod val="75000"/>
+                  </a:schemeClr>
+                </a:solidFill>
+              </a:rPr>
+              <a:t>Turtles All the Way Down</a:t>
+            </a:r>
+            <a:r>
+              <a:rPr lang="en-US" sz="2900" dirty="0">
+                <a:solidFill>
+                  <a:schemeClr val="accent2">
+                    <a:lumMod val="75000"/>
+                  </a:schemeClr>
+                </a:solidFill>
+              </a:rPr>
+              <a:t>) are checked out fewer than ten times in half of their available months.</a:t>
+            </a:r>
+          </a:p>
+        </p:txBody>
+      </p:sp>
+      <p:sp>
+        <p:nvSpPr>
+          <p:cNvPr id="38" name="Rectangle 37">
+            <a:extLst>
+              <a:ext uri="{FF2B5EF4-FFF2-40B4-BE49-F238E27FC236}">
+                <a16:creationId xmlns:a16="http://schemas.microsoft.com/office/drawing/2014/main" id="{6329CBCE-21AE-419D-AC1F-8ACF510A6670}"/>
+              </a:ext>
+              <a:ext uri="{C183D7F6-B498-43B3-948B-1728B52AA6E4}">
+                <adec:decorative xmlns:adec="http://schemas.microsoft.com/office/drawing/2017/decorative" val="1"/>
+              </a:ext>
+            </a:extLst>
+          </p:cNvPr>
+          <p:cNvSpPr>
+            <a:spLocks noGrp="1" noRot="1" noChangeAspect="1" noMove="1" noResize="1" noEditPoints="1" noAdjustHandles="1" noChangeArrowheads="1" noChangeShapeType="1" noTextEdit="1"/>
+          </p:cNvSpPr>
+          <p:nvPr>
+            <p:extLst>
+              <p:ext uri="{386F3935-93C4-4BCD-93E2-E3B085C9AB24}">
+                <p16:designElem xmlns:p16="http://schemas.microsoft.com/office/powerpoint/2015/main" val="1"/>
+              </p:ext>
+            </p:extLst>
+          </p:nvPr>
+        </p:nvSpPr>
+        <p:spPr>
+          <a:xfrm>
+            <a:off x="15" y="6334316"/>
+            <a:ext cx="12191985" cy="66484"/>
+          </a:xfrm>
+          <a:prstGeom prst="rect">
+            <a:avLst/>
+          </a:prstGeom>
+          <a:solidFill>
+            <a:schemeClr val="accent1"/>
+          </a:solidFill>
+          <a:ln>
+            <a:noFill/>
+          </a:ln>
+        </p:spPr>
+        <p:style>
+          <a:lnRef idx="2">
+            <a:schemeClr val="accent1">
+              <a:shade val="50000"/>
+            </a:schemeClr>
+          </a:lnRef>
+          <a:fillRef idx="1">
+            <a:schemeClr val="accent1"/>
+          </a:fillRef>
+          <a:effectRef idx="0">
+            <a:schemeClr val="accent1"/>
+          </a:effectRef>
+          <a:fontRef idx="minor">
+            <a:schemeClr val="lt1"/>
+          </a:fontRef>
+        </p:style>
         <p:txBody>
           <a:bodyPr/>
           <a:lstStyle/>
           <a:p>
-            <a:r>
-              <a:rPr lang="en-US" dirty="0"/>
-              <a:t>How much is the typical book checked out?</a:t>
-            </a:r>
-          </a:p>
-          <a:p>
-            <a:r>
-              <a:rPr lang="en-US" dirty="0"/>
-              <a:t>Where are we drawing the line for popular?</a:t>
-            </a:r>
+            <a:endParaRPr lang="en-US"/>
+          </a:p>
+        </p:txBody>
+      </p:sp>
+      <p:sp>
+        <p:nvSpPr>
+          <p:cNvPr id="40" name="Rectangle 39">
+            <a:extLst>
+              <a:ext uri="{FF2B5EF4-FFF2-40B4-BE49-F238E27FC236}">
+                <a16:creationId xmlns:a16="http://schemas.microsoft.com/office/drawing/2014/main" id="{FF2DA012-1414-493D-888F-5D99D0BDA322}"/>
+              </a:ext>
+              <a:ext uri="{C183D7F6-B498-43B3-948B-1728B52AA6E4}">
+                <adec:decorative xmlns:adec="http://schemas.microsoft.com/office/drawing/2017/decorative" val="1"/>
+              </a:ext>
+            </a:extLst>
+          </p:cNvPr>
+          <p:cNvSpPr>
+            <a:spLocks noGrp="1" noRot="1" noChangeAspect="1" noMove="1" noResize="1" noEditPoints="1" noAdjustHandles="1" noChangeArrowheads="1" noChangeShapeType="1" noTextEdit="1"/>
+          </p:cNvSpPr>
+          <p:nvPr>
+            <p:extLst>
+              <p:ext uri="{386F3935-93C4-4BCD-93E2-E3B085C9AB24}">
+                <p16:designElem xmlns:p16="http://schemas.microsoft.com/office/powerpoint/2015/main" val="1"/>
+              </p:ext>
+            </p:extLst>
+          </p:nvPr>
+        </p:nvSpPr>
+        <p:spPr>
+          <a:xfrm>
+            <a:off x="1" y="6400800"/>
+            <a:ext cx="12192000" cy="457200"/>
+          </a:xfrm>
+          <a:prstGeom prst="rect">
+            <a:avLst/>
+          </a:prstGeom>
+          <a:solidFill>
+            <a:schemeClr val="accent2"/>
+          </a:solidFill>
+          <a:ln>
+            <a:noFill/>
+          </a:ln>
+        </p:spPr>
+        <p:style>
+          <a:lnRef idx="2">
+            <a:schemeClr val="accent1">
+              <a:shade val="50000"/>
+            </a:schemeClr>
+          </a:lnRef>
+          <a:fillRef idx="1">
+            <a:schemeClr val="accent1"/>
+          </a:fillRef>
+          <a:effectRef idx="0">
+            <a:schemeClr val="accent1"/>
+          </a:effectRef>
+          <a:fontRef idx="minor">
+            <a:schemeClr val="lt1"/>
+          </a:fontRef>
+        </p:style>
+        <p:txBody>
+          <a:bodyPr/>
+          <a:lstStyle/>
+          <a:p>
+            <a:endParaRPr lang="en-US"/>
           </a:p>
         </p:txBody>
       </p:sp>
     </p:spTree>
     <p:extLst>
       <p:ext uri="{BB962C8B-B14F-4D97-AF65-F5344CB8AC3E}">
-        <p14:creationId xmlns:p14="http://schemas.microsoft.com/office/powerpoint/2010/main" val="891259802"/>
+        <p14:creationId xmlns:p14="http://schemas.microsoft.com/office/powerpoint/2010/main" val="1516765156"/>
       </p:ext>
     </p:extLst>
   </p:cSld>
@@ -6037,4 +7578,319 @@
     </a:ext>
   </a:extLst>
 </a:theme>
+</file>
+
+<file path=ppt/theme/theme2.xml><?xml version="1.0" encoding="utf-8"?>
+<a:theme xmlns:a="http://schemas.openxmlformats.org/drawingml/2006/main" name="Office Theme">
+  <a:themeElements>
+    <a:clrScheme name="Office">
+      <a:dk1>
+        <a:sysClr val="windowText" lastClr="000000"/>
+      </a:dk1>
+      <a:lt1>
+        <a:sysClr val="window" lastClr="FFFFFF"/>
+      </a:lt1>
+      <a:dk2>
+        <a:srgbClr val="0E2841"/>
+      </a:dk2>
+      <a:lt2>
+        <a:srgbClr val="E8E8E8"/>
+      </a:lt2>
+      <a:accent1>
+        <a:srgbClr val="156082"/>
+      </a:accent1>
+      <a:accent2>
+        <a:srgbClr val="E97132"/>
+      </a:accent2>
+      <a:accent3>
+        <a:srgbClr val="196B24"/>
+      </a:accent3>
+      <a:accent4>
+        <a:srgbClr val="0F9ED5"/>
+      </a:accent4>
+      <a:accent5>
+        <a:srgbClr val="A02B93"/>
+      </a:accent5>
+      <a:accent6>
+        <a:srgbClr val="4EA72E"/>
+      </a:accent6>
+      <a:hlink>
+        <a:srgbClr val="467886"/>
+      </a:hlink>
+      <a:folHlink>
+        <a:srgbClr val="96607D"/>
+      </a:folHlink>
+    </a:clrScheme>
+    <a:fontScheme name="Office">
+      <a:majorFont>
+        <a:latin typeface="Aptos Display" panose="02110004020202020204"/>
+        <a:ea typeface=""/>
+        <a:cs typeface=""/>
+        <a:font script="Jpan" typeface="游ゴシック Light"/>
+        <a:font script="Hang" typeface="맑은 고딕"/>
+        <a:font script="Hans" typeface="等线 Light"/>
+        <a:font script="Hant" typeface="新細明體"/>
+        <a:font script="Arab" typeface="Times New Roman"/>
+        <a:font script="Hebr" typeface="Times New Roman"/>
+        <a:font script="Thai" typeface="Angsana New"/>
+        <a:font script="Ethi" typeface="Nyala"/>
+        <a:font script="Beng" typeface="Vrinda"/>
+        <a:font script="Gujr" typeface="Shruti"/>
+        <a:font script="Khmr" typeface="MoolBoran"/>
+        <a:font script="Knda" typeface="Tunga"/>
+        <a:font script="Guru" typeface="Raavi"/>
+        <a:font script="Cans" typeface="Euphemia"/>
+        <a:font script="Cher" typeface="Plantagenet Cherokee"/>
+        <a:font script="Yiii" typeface="Microsoft Yi Baiti"/>
+        <a:font script="Tibt" typeface="Microsoft Himalaya"/>
+        <a:font script="Thaa" typeface="MV Boli"/>
+        <a:font script="Deva" typeface="Mangal"/>
+        <a:font script="Telu" typeface="Gautami"/>
+        <a:font script="Taml" typeface="Latha"/>
+        <a:font script="Syrc" typeface="Estrangelo Edessa"/>
+        <a:font script="Orya" typeface="Kalinga"/>
+        <a:font script="Mlym" typeface="Kartika"/>
+        <a:font script="Laoo" typeface="DokChampa"/>
+        <a:font script="Sinh" typeface="Iskoola Pota"/>
+        <a:font script="Mong" typeface="Mongolian Baiti"/>
+        <a:font script="Viet" typeface="Times New Roman"/>
+        <a:font script="Uigh" typeface="Microsoft Uighur"/>
+        <a:font script="Geor" typeface="Sylfaen"/>
+        <a:font script="Armn" typeface="Arial"/>
+        <a:font script="Bugi" typeface="Leelawadee UI"/>
+        <a:font script="Bopo" typeface="Microsoft JhengHei"/>
+        <a:font script="Java" typeface="Javanese Text"/>
+        <a:font script="Lisu" typeface="Segoe UI"/>
+        <a:font script="Mymr" typeface="Myanmar Text"/>
+        <a:font script="Nkoo" typeface="Ebrima"/>
+        <a:font script="Olck" typeface="Nirmala UI"/>
+        <a:font script="Osma" typeface="Ebrima"/>
+        <a:font script="Phag" typeface="Phagspa"/>
+        <a:font script="Syrn" typeface="Estrangelo Edessa"/>
+        <a:font script="Syrj" typeface="Estrangelo Edessa"/>
+        <a:font script="Syre" typeface="Estrangelo Edessa"/>
+        <a:font script="Sora" typeface="Nirmala UI"/>
+        <a:font script="Tale" typeface="Microsoft Tai Le"/>
+        <a:font script="Talu" typeface="Microsoft New Tai Lue"/>
+        <a:font script="Tfng" typeface="Ebrima"/>
+      </a:majorFont>
+      <a:minorFont>
+        <a:latin typeface="Aptos" panose="02110004020202020204"/>
+        <a:ea typeface=""/>
+        <a:cs typeface=""/>
+        <a:font script="Jpan" typeface="游ゴシック"/>
+        <a:font script="Hang" typeface="맑은 고딕"/>
+        <a:font script="Hans" typeface="等线"/>
+        <a:font script="Hant" typeface="新細明體"/>
+        <a:font script="Arab" typeface="Arial"/>
+        <a:font script="Hebr" typeface="Arial"/>
+        <a:font script="Thai" typeface="Cordia New"/>
+        <a:font script="Ethi" typeface="Nyala"/>
+        <a:font script="Beng" typeface="Vrinda"/>
+        <a:font script="Gujr" typeface="Shruti"/>
+        <a:font script="Khmr" typeface="DaunPenh"/>
+        <a:font script="Knda" typeface="Tunga"/>
+        <a:font script="Guru" typeface="Raavi"/>
+        <a:font script="Cans" typeface="Euphemia"/>
+        <a:font script="Cher" typeface="Plantagenet Cherokee"/>
+        <a:font script="Yiii" typeface="Microsoft Yi Baiti"/>
+        <a:font script="Tibt" typeface="Microsoft Himalaya"/>
+        <a:font script="Thaa" typeface="MV Boli"/>
+        <a:font script="Deva" typeface="Mangal"/>
+        <a:font script="Telu" typeface="Gautami"/>
+        <a:font script="Taml" typeface="Latha"/>
+        <a:font script="Syrc" typeface="Estrangelo Edessa"/>
+        <a:font script="Orya" typeface="Kalinga"/>
+        <a:font script="Mlym" typeface="Kartika"/>
+        <a:font script="Laoo" typeface="DokChampa"/>
+        <a:font script="Sinh" typeface="Iskoola Pota"/>
+        <a:font script="Mong" typeface="Mongolian Baiti"/>
+        <a:font script="Viet" typeface="Arial"/>
+        <a:font script="Uigh" typeface="Microsoft Uighur"/>
+        <a:font script="Geor" typeface="Sylfaen"/>
+        <a:font script="Armn" typeface="Arial"/>
+        <a:font script="Bugi" typeface="Leelawadee UI"/>
+        <a:font script="Bopo" typeface="Microsoft JhengHei"/>
+        <a:font script="Java" typeface="Javanese Text"/>
+        <a:font script="Lisu" typeface="Segoe UI"/>
+        <a:font script="Mymr" typeface="Myanmar Text"/>
+        <a:font script="Nkoo" typeface="Ebrima"/>
+        <a:font script="Olck" typeface="Nirmala UI"/>
+        <a:font script="Osma" typeface="Ebrima"/>
+        <a:font script="Phag" typeface="Phagspa"/>
+        <a:font script="Syrn" typeface="Estrangelo Edessa"/>
+        <a:font script="Syrj" typeface="Estrangelo Edessa"/>
+        <a:font script="Syre" typeface="Estrangelo Edessa"/>
+        <a:font script="Sora" typeface="Nirmala UI"/>
+        <a:font script="Tale" typeface="Microsoft Tai Le"/>
+        <a:font script="Talu" typeface="Microsoft New Tai Lue"/>
+        <a:font script="Tfng" typeface="Ebrima"/>
+      </a:minorFont>
+    </a:fontScheme>
+    <a:fmtScheme name="Office">
+      <a:fillStyleLst>
+        <a:solidFill>
+          <a:schemeClr val="phClr"/>
+        </a:solidFill>
+        <a:gradFill rotWithShape="1">
+          <a:gsLst>
+            <a:gs pos="0">
+              <a:schemeClr val="phClr">
+                <a:lumMod val="110000"/>
+                <a:satMod val="105000"/>
+                <a:tint val="67000"/>
+              </a:schemeClr>
+            </a:gs>
+            <a:gs pos="50000">
+              <a:schemeClr val="phClr">
+                <a:lumMod val="105000"/>
+                <a:satMod val="103000"/>
+                <a:tint val="73000"/>
+              </a:schemeClr>
+            </a:gs>
+            <a:gs pos="100000">
+              <a:schemeClr val="phClr">
+                <a:lumMod val="105000"/>
+                <a:satMod val="109000"/>
+                <a:tint val="81000"/>
+              </a:schemeClr>
+            </a:gs>
+          </a:gsLst>
+          <a:lin ang="5400000" scaled="0"/>
+        </a:gradFill>
+        <a:gradFill rotWithShape="1">
+          <a:gsLst>
+            <a:gs pos="0">
+              <a:schemeClr val="phClr">
+                <a:satMod val="103000"/>
+                <a:lumMod val="102000"/>
+                <a:tint val="94000"/>
+              </a:schemeClr>
+            </a:gs>
+            <a:gs pos="50000">
+              <a:schemeClr val="phClr">
+                <a:satMod val="110000"/>
+                <a:lumMod val="100000"/>
+                <a:shade val="100000"/>
+              </a:schemeClr>
+            </a:gs>
+            <a:gs pos="100000">
+              <a:schemeClr val="phClr">
+                <a:lumMod val="99000"/>
+                <a:satMod val="120000"/>
+                <a:shade val="78000"/>
+              </a:schemeClr>
+            </a:gs>
+          </a:gsLst>
+          <a:lin ang="5400000" scaled="0"/>
+        </a:gradFill>
+      </a:fillStyleLst>
+      <a:lnStyleLst>
+        <a:ln w="12700" cap="flat" cmpd="sng" algn="ctr">
+          <a:solidFill>
+            <a:schemeClr val="phClr"/>
+          </a:solidFill>
+          <a:prstDash val="solid"/>
+          <a:miter lim="800000"/>
+        </a:ln>
+        <a:ln w="19050" cap="flat" cmpd="sng" algn="ctr">
+          <a:solidFill>
+            <a:schemeClr val="phClr"/>
+          </a:solidFill>
+          <a:prstDash val="solid"/>
+          <a:miter lim="800000"/>
+        </a:ln>
+        <a:ln w="25400" cap="flat" cmpd="sng" algn="ctr">
+          <a:solidFill>
+            <a:schemeClr val="phClr"/>
+          </a:solidFill>
+          <a:prstDash val="solid"/>
+          <a:miter lim="800000"/>
+        </a:ln>
+      </a:lnStyleLst>
+      <a:effectStyleLst>
+        <a:effectStyle>
+          <a:effectLst/>
+        </a:effectStyle>
+        <a:effectStyle>
+          <a:effectLst/>
+        </a:effectStyle>
+        <a:effectStyle>
+          <a:effectLst>
+            <a:outerShdw blurRad="57150" dist="19050" dir="5400000" algn="ctr" rotWithShape="0">
+              <a:srgbClr val="000000">
+                <a:alpha val="63000"/>
+              </a:srgbClr>
+            </a:outerShdw>
+          </a:effectLst>
+        </a:effectStyle>
+      </a:effectStyleLst>
+      <a:bgFillStyleLst>
+        <a:solidFill>
+          <a:schemeClr val="phClr"/>
+        </a:solidFill>
+        <a:solidFill>
+          <a:schemeClr val="phClr">
+            <a:tint val="95000"/>
+            <a:satMod val="170000"/>
+          </a:schemeClr>
+        </a:solidFill>
+        <a:gradFill rotWithShape="1">
+          <a:gsLst>
+            <a:gs pos="0">
+              <a:schemeClr val="phClr">
+                <a:tint val="93000"/>
+                <a:satMod val="150000"/>
+                <a:shade val="98000"/>
+                <a:lumMod val="102000"/>
+              </a:schemeClr>
+            </a:gs>
+            <a:gs pos="50000">
+              <a:schemeClr val="phClr">
+                <a:tint val="98000"/>
+                <a:satMod val="130000"/>
+                <a:shade val="90000"/>
+                <a:lumMod val="103000"/>
+              </a:schemeClr>
+            </a:gs>
+            <a:gs pos="100000">
+              <a:schemeClr val="phClr">
+                <a:shade val="63000"/>
+                <a:satMod val="120000"/>
+              </a:schemeClr>
+            </a:gs>
+          </a:gsLst>
+          <a:lin ang="5400000" scaled="0"/>
+        </a:gradFill>
+      </a:bgFillStyleLst>
+    </a:fmtScheme>
+  </a:themeElements>
+  <a:objectDefaults>
+    <a:lnDef>
+      <a:spPr/>
+      <a:bodyPr/>
+      <a:lstStyle/>
+      <a:style>
+        <a:lnRef idx="2">
+          <a:schemeClr val="accent1"/>
+        </a:lnRef>
+        <a:fillRef idx="0">
+          <a:schemeClr val="accent1"/>
+        </a:fillRef>
+        <a:effectRef idx="1">
+          <a:schemeClr val="accent1"/>
+        </a:effectRef>
+        <a:fontRef idx="minor">
+          <a:schemeClr val="tx1"/>
+        </a:fontRef>
+      </a:style>
+    </a:lnDef>
+  </a:objectDefaults>
+  <a:extraClrSchemeLst/>
+  <a:extLst>
+    <a:ext uri="{05A4C25C-085E-4340-85A3-A5531E510DB2}">
+      <thm15:themeFamily xmlns:thm15="http://schemas.microsoft.com/office/thememl/2012/main" name="Office Theme" id="{2E142A2C-CD16-42D6-873A-C26D2A0506FA}" vid="{1BDDFF52-6CD6-40A5-AB3C-68EB2F1E4D0A}"/>
+    </a:ext>
+  </a:extLst>
+</a:theme>
 </file>
</xml_diff>